<commit_message>
Aktualisierung "EntwurfNetzwerkschicht.pptx" im Ordner "ressources". Hier habe ich Folien eingefügt, wie Jano die Netzwerkschicht entworfen hat.
</commit_message>
<xml_diff>
--- a/Game of Colours/ressources/EntwurfNetzwerkschicht.pptx
+++ b/Game of Colours/ressources/EntwurfNetzwerkschicht.pptx
@@ -1,15 +1,19 @@
 
 <file path=ppt/presentation.xml><?xml version="1.0" encoding="utf-8"?>
-<p:presentation xmlns:a="http://schemas.openxmlformats.org/drawingml/2006/main" xmlns:r="http://schemas.openxmlformats.org/officeDocument/2006/relationships" xmlns:p="http://schemas.openxmlformats.org/presentationml/2006/main" saveSubsetFonts="1">
+<p:presentation xmlns:a="http://schemas.openxmlformats.org/drawingml/2006/main" xmlns:r="http://schemas.openxmlformats.org/officeDocument/2006/relationships" xmlns:p="http://schemas.openxmlformats.org/presentationml/2006/main" serverZoom="34734" saveSubsetFonts="1">
   <p:sldMasterIdLst>
     <p:sldMasterId id="2147483660" r:id="rId1"/>
   </p:sldMasterIdLst>
   <p:sldIdLst>
     <p:sldId id="256" r:id="rId2"/>
     <p:sldId id="257" r:id="rId3"/>
-    <p:sldId id="258" r:id="rId4"/>
-    <p:sldId id="260" r:id="rId5"/>
-    <p:sldId id="259" r:id="rId6"/>
+    <p:sldId id="261" r:id="rId4"/>
+    <p:sldId id="263" r:id="rId5"/>
+    <p:sldId id="264" r:id="rId6"/>
+    <p:sldId id="262" r:id="rId7"/>
+    <p:sldId id="258" r:id="rId8"/>
+    <p:sldId id="260" r:id="rId9"/>
+    <p:sldId id="259" r:id="rId10"/>
   </p:sldIdLst>
   <p:sldSz cx="12192000" cy="6858000"/>
   <p:notesSz cx="6858000" cy="9144000"/>
@@ -108,6 +112,11 @@
       </a:defRPr>
     </a:lvl9pPr>
   </p:defaultTextStyle>
+  <p:extLst>
+    <p:ext uri="{EFAFB233-063F-42B5-8137-9DF3F51BA10A}">
+      <p15:sldGuideLst xmlns:p15="http://schemas.microsoft.com/office/powerpoint/2012/main"/>
+    </p:ext>
+  </p:extLst>
 </p:presentation>
 </file>
 
@@ -250,7 +259,7 @@
           <a:p>
             <a:fld id="{FA4F5965-8405-4D70-9CE2-9CC7054E67C5}" type="datetimeFigureOut">
               <a:rPr lang="de-DE" smtClean="0"/>
-              <a:t>08.05.2021</a:t>
+              <a:t>25.09.2021</a:t>
             </a:fld>
             <a:endParaRPr lang="de-DE"/>
           </a:p>
@@ -461,7 +470,7 @@
           <a:p>
             <a:fld id="{FA4F5965-8405-4D70-9CE2-9CC7054E67C5}" type="datetimeFigureOut">
               <a:rPr lang="de-DE" smtClean="0"/>
-              <a:t>08.05.2021</a:t>
+              <a:t>25.09.2021</a:t>
             </a:fld>
             <a:endParaRPr lang="de-DE"/>
           </a:p>
@@ -676,7 +685,7 @@
           <a:p>
             <a:fld id="{FA4F5965-8405-4D70-9CE2-9CC7054E67C5}" type="datetimeFigureOut">
               <a:rPr lang="de-DE" smtClean="0"/>
-              <a:t>08.05.2021</a:t>
+              <a:t>25.09.2021</a:t>
             </a:fld>
             <a:endParaRPr lang="de-DE"/>
           </a:p>
@@ -877,7 +886,7 @@
           <a:p>
             <a:fld id="{FA4F5965-8405-4D70-9CE2-9CC7054E67C5}" type="datetimeFigureOut">
               <a:rPr lang="de-DE" smtClean="0"/>
-              <a:t>08.05.2021</a:t>
+              <a:t>25.09.2021</a:t>
             </a:fld>
             <a:endParaRPr lang="de-DE"/>
           </a:p>
@@ -1156,7 +1165,7 @@
           <a:p>
             <a:fld id="{FA4F5965-8405-4D70-9CE2-9CC7054E67C5}" type="datetimeFigureOut">
               <a:rPr lang="de-DE" smtClean="0"/>
-              <a:t>08.05.2021</a:t>
+              <a:t>25.09.2021</a:t>
             </a:fld>
             <a:endParaRPr lang="de-DE"/>
           </a:p>
@@ -1424,7 +1433,7 @@
           <a:p>
             <a:fld id="{FA4F5965-8405-4D70-9CE2-9CC7054E67C5}" type="datetimeFigureOut">
               <a:rPr lang="de-DE" smtClean="0"/>
-              <a:t>08.05.2021</a:t>
+              <a:t>25.09.2021</a:t>
             </a:fld>
             <a:endParaRPr lang="de-DE"/>
           </a:p>
@@ -1840,7 +1849,7 @@
           <a:p>
             <a:fld id="{FA4F5965-8405-4D70-9CE2-9CC7054E67C5}" type="datetimeFigureOut">
               <a:rPr lang="de-DE" smtClean="0"/>
-              <a:t>08.05.2021</a:t>
+              <a:t>25.09.2021</a:t>
             </a:fld>
             <a:endParaRPr lang="de-DE"/>
           </a:p>
@@ -1989,7 +1998,7 @@
           <a:p>
             <a:fld id="{FA4F5965-8405-4D70-9CE2-9CC7054E67C5}" type="datetimeFigureOut">
               <a:rPr lang="de-DE" smtClean="0"/>
-              <a:t>08.05.2021</a:t>
+              <a:t>25.09.2021</a:t>
             </a:fld>
             <a:endParaRPr lang="de-DE"/>
           </a:p>
@@ -2115,7 +2124,7 @@
           <a:p>
             <a:fld id="{FA4F5965-8405-4D70-9CE2-9CC7054E67C5}" type="datetimeFigureOut">
               <a:rPr lang="de-DE" smtClean="0"/>
-              <a:t>08.05.2021</a:t>
+              <a:t>25.09.2021</a:t>
             </a:fld>
             <a:endParaRPr lang="de-DE"/>
           </a:p>
@@ -2366,7 +2375,7 @@
           <a:p>
             <a:fld id="{FA4F5965-8405-4D70-9CE2-9CC7054E67C5}" type="datetimeFigureOut">
               <a:rPr lang="de-DE" smtClean="0"/>
-              <a:t>08.05.2021</a:t>
+              <a:t>25.09.2021</a:t>
             </a:fld>
             <a:endParaRPr lang="de-DE"/>
           </a:p>
@@ -2811,7 +2820,7 @@
           <a:p>
             <a:fld id="{FA4F5965-8405-4D70-9CE2-9CC7054E67C5}" type="datetimeFigureOut">
               <a:rPr lang="de-DE" smtClean="0"/>
-              <a:t>08.05.2021</a:t>
+              <a:t>25.09.2021</a:t>
             </a:fld>
             <a:endParaRPr lang="de-DE"/>
           </a:p>
@@ -3137,7 +3146,7 @@
           <a:p>
             <a:fld id="{FA4F5965-8405-4D70-9CE2-9CC7054E67C5}" type="datetimeFigureOut">
               <a:rPr lang="de-DE" smtClean="0"/>
-              <a:t>08.05.2021</a:t>
+              <a:t>25.09.2021</a:t>
             </a:fld>
             <a:endParaRPr lang="de-DE"/>
           </a:p>
@@ -4910,6 +4919,3197 @@
 </file>
 
 <file path=ppt/slides/slide3.xml><?xml version="1.0" encoding="utf-8"?>
+<p:sld xmlns:a="http://schemas.openxmlformats.org/drawingml/2006/main" xmlns:r="http://schemas.openxmlformats.org/officeDocument/2006/relationships" xmlns:p="http://schemas.openxmlformats.org/presentationml/2006/main">
+  <p:cSld>
+    <p:spTree>
+      <p:nvGrpSpPr>
+        <p:cNvPr id="1" name=""/>
+        <p:cNvGrpSpPr/>
+        <p:nvPr/>
+      </p:nvGrpSpPr>
+      <p:grpSpPr>
+        <a:xfrm>
+          <a:off x="0" y="0"/>
+          <a:ext cx="0" cy="0"/>
+          <a:chOff x="0" y="0"/>
+          <a:chExt cx="0" cy="0"/>
+        </a:xfrm>
+      </p:grpSpPr>
+      <p:sp>
+        <p:nvSpPr>
+          <p:cNvPr id="2" name="Titel 1"/>
+          <p:cNvSpPr>
+            <a:spLocks noGrp="1"/>
+          </p:cNvSpPr>
+          <p:nvPr>
+            <p:ph type="title"/>
+          </p:nvPr>
+        </p:nvSpPr>
+        <p:spPr/>
+        <p:txBody>
+          <a:bodyPr/>
+          <a:lstStyle/>
+          <a:p>
+            <a:r>
+              <a:rPr lang="de-DE" dirty="0"/>
+              <a:t>Ein Entwurf</a:t>
+            </a:r>
+          </a:p>
+        </p:txBody>
+      </p:sp>
+      <p:sp>
+        <p:nvSpPr>
+          <p:cNvPr id="3" name="Textplatzhalter 2"/>
+          <p:cNvSpPr>
+            <a:spLocks noGrp="1"/>
+          </p:cNvSpPr>
+          <p:nvPr>
+            <p:ph type="body" idx="1"/>
+          </p:nvPr>
+        </p:nvSpPr>
+        <p:spPr/>
+        <p:txBody>
+          <a:bodyPr/>
+          <a:lstStyle/>
+          <a:p>
+            <a:r>
+              <a:rPr lang="de-DE" dirty="0"/>
+              <a:t>Eine Überlegung, wie die Nachrichten während der Spielphase zwischen den Rechnern ausgetauscht werden können. (Die Initialisierungsphase ist hier schon gelaufen.)</a:t>
+            </a:r>
+          </a:p>
+        </p:txBody>
+      </p:sp>
+    </p:spTree>
+    <p:extLst>
+      <p:ext uri="{BB962C8B-B14F-4D97-AF65-F5344CB8AC3E}">
+        <p14:creationId xmlns:p14="http://schemas.microsoft.com/office/powerpoint/2010/main" val="546269806"/>
+      </p:ext>
+    </p:extLst>
+  </p:cSld>
+  <p:clrMapOvr>
+    <a:masterClrMapping/>
+  </p:clrMapOvr>
+</p:sld>
+</file>
+
+<file path=ppt/slides/slide4.xml><?xml version="1.0" encoding="utf-8"?>
+<p:sld xmlns:a="http://schemas.openxmlformats.org/drawingml/2006/main" xmlns:r="http://schemas.openxmlformats.org/officeDocument/2006/relationships" xmlns:p="http://schemas.openxmlformats.org/presentationml/2006/main">
+  <p:cSld>
+    <p:spTree>
+      <p:nvGrpSpPr>
+        <p:cNvPr id="1" name=""/>
+        <p:cNvGrpSpPr/>
+        <p:nvPr/>
+      </p:nvGrpSpPr>
+      <p:grpSpPr>
+        <a:xfrm>
+          <a:off x="0" y="0"/>
+          <a:ext cx="0" cy="0"/>
+          <a:chOff x="0" y="0"/>
+          <a:chExt cx="0" cy="0"/>
+        </a:xfrm>
+      </p:grpSpPr>
+      <p:sp>
+        <p:nvSpPr>
+          <p:cNvPr id="2" name="Titel 1"/>
+          <p:cNvSpPr>
+            <a:spLocks noGrp="1"/>
+          </p:cNvSpPr>
+          <p:nvPr>
+            <p:ph type="title"/>
+          </p:nvPr>
+        </p:nvSpPr>
+        <p:spPr/>
+        <p:txBody>
+          <a:bodyPr>
+            <a:normAutofit/>
+          </a:bodyPr>
+          <a:lstStyle/>
+          <a:p>
+            <a:r>
+              <a:rPr lang="de-DE" dirty="0"/>
+              <a:t>Die Aufgaben der einzelnen Schichten für die Kommunikation während des Spiels</a:t>
+            </a:r>
+          </a:p>
+        </p:txBody>
+      </p:sp>
+      <p:sp>
+        <p:nvSpPr>
+          <p:cNvPr id="3" name="Inhaltsplatzhalter 2"/>
+          <p:cNvSpPr>
+            <a:spLocks noGrp="1"/>
+          </p:cNvSpPr>
+          <p:nvPr>
+            <p:ph idx="1"/>
+          </p:nvPr>
+        </p:nvSpPr>
+        <p:spPr>
+          <a:xfrm>
+            <a:off x="108915" y="4898791"/>
+            <a:ext cx="5668675" cy="1131148"/>
+          </a:xfrm>
+        </p:spPr>
+        <p:txBody>
+          <a:bodyPr>
+            <a:normAutofit fontScale="32500" lnSpcReduction="20000"/>
+          </a:bodyPr>
+          <a:lstStyle/>
+          <a:p>
+            <a:r>
+              <a:rPr lang="de-DE" sz="4300" dirty="0"/>
+              <a:t>Legende:</a:t>
+            </a:r>
+          </a:p>
+          <a:p>
+            <a:pPr lvl="1">
+              <a:tabLst>
+                <a:tab pos="2870200" algn="l"/>
+              </a:tabLst>
+            </a:pPr>
+            <a:r>
+              <a:rPr lang="de-DE" sz="3400" dirty="0"/>
+              <a:t>Benachrichtigung durch Observation:	wird observiert durch (Observer-Pattern)</a:t>
+            </a:r>
+          </a:p>
+          <a:p>
+            <a:pPr lvl="1">
+              <a:tabLst>
+                <a:tab pos="2870200" algn="l"/>
+              </a:tabLst>
+            </a:pPr>
+            <a:r>
+              <a:rPr lang="de-DE" sz="3400" dirty="0"/>
+              <a:t>Benachrichtigung durch Aufruf: 	ruft auf</a:t>
+            </a:r>
+          </a:p>
+          <a:p>
+            <a:pPr lvl="1">
+              <a:tabLst>
+                <a:tab pos="2870200" algn="l"/>
+              </a:tabLst>
+            </a:pPr>
+            <a:r>
+              <a:rPr lang="de-DE" sz="3400" dirty="0"/>
+              <a:t>Benachrichtigung durch Anfrage: 	fragt an / sendet Nachricht</a:t>
+            </a:r>
+          </a:p>
+          <a:p>
+            <a:pPr lvl="1"/>
+            <a:endParaRPr lang="de-DE" dirty="0"/>
+          </a:p>
+        </p:txBody>
+      </p:sp>
+      <p:sp>
+        <p:nvSpPr>
+          <p:cNvPr id="24" name="Textfeld 23"/>
+          <p:cNvSpPr txBox="1"/>
+          <p:nvPr/>
+        </p:nvSpPr>
+        <p:spPr>
+          <a:xfrm>
+            <a:off x="1033353" y="2108153"/>
+            <a:ext cx="2668062" cy="2111422"/>
+          </a:xfrm>
+          <a:prstGeom prst="rect">
+            <a:avLst/>
+          </a:prstGeom>
+        </p:spPr>
+        <p:style>
+          <a:lnRef idx="1">
+            <a:schemeClr val="accent1"/>
+          </a:lnRef>
+          <a:fillRef idx="3">
+            <a:schemeClr val="accent1"/>
+          </a:fillRef>
+          <a:effectRef idx="2">
+            <a:schemeClr val="accent1"/>
+          </a:effectRef>
+          <a:fontRef idx="minor">
+            <a:schemeClr val="lt1"/>
+          </a:fontRef>
+        </p:style>
+        <p:txBody>
+          <a:bodyPr wrap="square" rtlCol="0">
+            <a:normAutofit/>
+          </a:bodyPr>
+          <a:lstStyle/>
+          <a:p>
+            <a:pPr algn="ctr"/>
+            <a:r>
+              <a:rPr lang="de-DE" sz="1400" dirty="0"/>
+              <a:t>Game </a:t>
+            </a:r>
+            <a:r>
+              <a:rPr lang="de-DE" sz="1400" dirty="0" err="1"/>
+              <a:t>of</a:t>
+            </a:r>
+            <a:r>
+              <a:rPr lang="de-DE" sz="1400" dirty="0"/>
+              <a:t> Colors</a:t>
+            </a:r>
+          </a:p>
+        </p:txBody>
+      </p:sp>
+      <p:sp>
+        <p:nvSpPr>
+          <p:cNvPr id="25" name="Textfeld 24"/>
+          <p:cNvSpPr txBox="1"/>
+          <p:nvPr/>
+        </p:nvSpPr>
+        <p:spPr>
+          <a:xfrm>
+            <a:off x="1200150" y="2529535"/>
+            <a:ext cx="2315209" cy="254820"/>
+          </a:xfrm>
+          <a:prstGeom prst="rect">
+            <a:avLst/>
+          </a:prstGeom>
+          <a:solidFill>
+            <a:schemeClr val="accent6"/>
+          </a:solidFill>
+          <a:ln>
+            <a:noFill/>
+          </a:ln>
+        </p:spPr>
+        <p:style>
+          <a:lnRef idx="0">
+            <a:scrgbClr r="0" g="0" b="0"/>
+          </a:lnRef>
+          <a:fillRef idx="0">
+            <a:scrgbClr r="0" g="0" b="0"/>
+          </a:fillRef>
+          <a:effectRef idx="0">
+            <a:scrgbClr r="0" g="0" b="0"/>
+          </a:effectRef>
+          <a:fontRef idx="minor">
+            <a:schemeClr val="lt1"/>
+          </a:fontRef>
+        </p:style>
+        <p:txBody>
+          <a:bodyPr wrap="none" rtlCol="0">
+            <a:normAutofit fontScale="70000" lnSpcReduction="20000"/>
+          </a:bodyPr>
+          <a:lstStyle/>
+          <a:p>
+            <a:pPr algn="ctr"/>
+            <a:r>
+              <a:rPr lang="de-DE" dirty="0"/>
+              <a:t>GUI</a:t>
+            </a:r>
+          </a:p>
+        </p:txBody>
+      </p:sp>
+      <p:sp>
+        <p:nvSpPr>
+          <p:cNvPr id="27" name="Textfeld 26"/>
+          <p:cNvSpPr txBox="1"/>
+          <p:nvPr/>
+        </p:nvSpPr>
+        <p:spPr>
+          <a:xfrm>
+            <a:off x="1200150" y="3621534"/>
+            <a:ext cx="2287268" cy="550416"/>
+          </a:xfrm>
+          <a:prstGeom prst="rect">
+            <a:avLst/>
+          </a:prstGeom>
+          <a:solidFill>
+            <a:schemeClr val="accent6"/>
+          </a:solidFill>
+          <a:ln>
+            <a:noFill/>
+          </a:ln>
+        </p:spPr>
+        <p:style>
+          <a:lnRef idx="0">
+            <a:scrgbClr r="0" g="0" b="0"/>
+          </a:lnRef>
+          <a:fillRef idx="0">
+            <a:scrgbClr r="0" g="0" b="0"/>
+          </a:fillRef>
+          <a:effectRef idx="0">
+            <a:scrgbClr r="0" g="0" b="0"/>
+          </a:effectRef>
+          <a:fontRef idx="minor">
+            <a:schemeClr val="lt1"/>
+          </a:fontRef>
+        </p:style>
+        <p:txBody>
+          <a:bodyPr wrap="none" rtlCol="0">
+            <a:normAutofit/>
+          </a:bodyPr>
+          <a:lstStyle/>
+          <a:p>
+            <a:pPr algn="ctr"/>
+            <a:r>
+              <a:rPr lang="de-DE" sz="1300" dirty="0"/>
+              <a:t>Net</a:t>
+            </a:r>
+          </a:p>
+        </p:txBody>
+      </p:sp>
+      <p:sp>
+        <p:nvSpPr>
+          <p:cNvPr id="28" name="Textfeld 27"/>
+          <p:cNvSpPr txBox="1"/>
+          <p:nvPr/>
+        </p:nvSpPr>
+        <p:spPr>
+          <a:xfrm>
+            <a:off x="1652467" y="3871451"/>
+            <a:ext cx="581025" cy="260974"/>
+          </a:xfrm>
+          <a:prstGeom prst="rect">
+            <a:avLst/>
+          </a:prstGeom>
+          <a:gradFill flip="none" rotWithShape="1">
+            <a:gsLst>
+              <a:gs pos="0">
+                <a:schemeClr val="dk1">
+                  <a:lumMod val="67000"/>
+                </a:schemeClr>
+              </a:gs>
+              <a:gs pos="48000">
+                <a:schemeClr val="dk1">
+                  <a:lumMod val="97000"/>
+                  <a:lumOff val="3000"/>
+                </a:schemeClr>
+              </a:gs>
+              <a:gs pos="100000">
+                <a:schemeClr val="dk1">
+                  <a:lumMod val="60000"/>
+                  <a:lumOff val="40000"/>
+                </a:schemeClr>
+              </a:gs>
+            </a:gsLst>
+            <a:lin ang="16200000" scaled="1"/>
+            <a:tileRect/>
+          </a:gradFill>
+          <a:ln>
+            <a:noFill/>
+          </a:ln>
+        </p:spPr>
+        <p:style>
+          <a:lnRef idx="0">
+            <a:scrgbClr r="0" g="0" b="0"/>
+          </a:lnRef>
+          <a:fillRef idx="0">
+            <a:scrgbClr r="0" g="0" b="0"/>
+          </a:fillRef>
+          <a:effectRef idx="0">
+            <a:scrgbClr r="0" g="0" b="0"/>
+          </a:effectRef>
+          <a:fontRef idx="minor">
+            <a:schemeClr val="lt1"/>
+          </a:fontRef>
+        </p:style>
+        <p:txBody>
+          <a:bodyPr wrap="none" rtlCol="0">
+            <a:normAutofit fontScale="70000" lnSpcReduction="20000"/>
+          </a:bodyPr>
+          <a:lstStyle/>
+          <a:p>
+            <a:pPr algn="ctr"/>
+            <a:r>
+              <a:rPr lang="de-DE" dirty="0"/>
+              <a:t>Client</a:t>
+            </a:r>
+          </a:p>
+        </p:txBody>
+      </p:sp>
+      <p:sp>
+        <p:nvSpPr>
+          <p:cNvPr id="30" name="Textfeld 29"/>
+          <p:cNvSpPr txBox="1"/>
+          <p:nvPr/>
+        </p:nvSpPr>
+        <p:spPr>
+          <a:xfrm>
+            <a:off x="2674455" y="3871451"/>
+            <a:ext cx="598072" cy="260974"/>
+          </a:xfrm>
+          <a:prstGeom prst="rect">
+            <a:avLst/>
+          </a:prstGeom>
+          <a:gradFill flip="none" rotWithShape="1">
+            <a:gsLst>
+              <a:gs pos="0">
+                <a:schemeClr val="dk1">
+                  <a:lumMod val="67000"/>
+                </a:schemeClr>
+              </a:gs>
+              <a:gs pos="48000">
+                <a:schemeClr val="dk1">
+                  <a:lumMod val="97000"/>
+                  <a:lumOff val="3000"/>
+                </a:schemeClr>
+              </a:gs>
+              <a:gs pos="100000">
+                <a:schemeClr val="dk1">
+                  <a:lumMod val="60000"/>
+                  <a:lumOff val="40000"/>
+                </a:schemeClr>
+              </a:gs>
+            </a:gsLst>
+            <a:lin ang="16200000" scaled="1"/>
+            <a:tileRect/>
+          </a:gradFill>
+          <a:ln>
+            <a:noFill/>
+          </a:ln>
+        </p:spPr>
+        <p:style>
+          <a:lnRef idx="0">
+            <a:scrgbClr r="0" g="0" b="0"/>
+          </a:lnRef>
+          <a:fillRef idx="0">
+            <a:scrgbClr r="0" g="0" b="0"/>
+          </a:fillRef>
+          <a:effectRef idx="0">
+            <a:scrgbClr r="0" g="0" b="0"/>
+          </a:effectRef>
+          <a:fontRef idx="minor">
+            <a:schemeClr val="lt1"/>
+          </a:fontRef>
+        </p:style>
+        <p:txBody>
+          <a:bodyPr wrap="none" rtlCol="0">
+            <a:normAutofit fontScale="70000" lnSpcReduction="20000"/>
+          </a:bodyPr>
+          <a:lstStyle/>
+          <a:p>
+            <a:pPr algn="ctr"/>
+            <a:r>
+              <a:rPr lang="de-DE" dirty="0"/>
+              <a:t>Server</a:t>
+            </a:r>
+          </a:p>
+        </p:txBody>
+      </p:sp>
+      <p:cxnSp>
+        <p:nvCxnSpPr>
+          <p:cNvPr id="34" name="Gerade Verbindung mit Pfeil 33"/>
+          <p:cNvCxnSpPr/>
+          <p:nvPr/>
+        </p:nvCxnSpPr>
+        <p:spPr>
+          <a:xfrm flipV="1">
+            <a:off x="1765270" y="2784355"/>
+            <a:ext cx="0" cy="285026"/>
+          </a:xfrm>
+          <a:prstGeom prst="straightConnector1">
+            <a:avLst/>
+          </a:prstGeom>
+          <a:ln w="44450">
+            <a:solidFill>
+              <a:srgbClr val="FFFF00"/>
+            </a:solidFill>
+            <a:tailEnd type="triangle"/>
+          </a:ln>
+        </p:spPr>
+        <p:style>
+          <a:lnRef idx="3">
+            <a:schemeClr val="accent6"/>
+          </a:lnRef>
+          <a:fillRef idx="0">
+            <a:schemeClr val="accent6"/>
+          </a:fillRef>
+          <a:effectRef idx="2">
+            <a:schemeClr val="accent6"/>
+          </a:effectRef>
+          <a:fontRef idx="minor">
+            <a:schemeClr val="tx1"/>
+          </a:fontRef>
+        </p:style>
+      </p:cxnSp>
+      <p:cxnSp>
+        <p:nvCxnSpPr>
+          <p:cNvPr id="36" name="Gerade Verbindung mit Pfeil 35"/>
+          <p:cNvCxnSpPr/>
+          <p:nvPr/>
+        </p:nvCxnSpPr>
+        <p:spPr>
+          <a:xfrm>
+            <a:off x="1942979" y="2784355"/>
+            <a:ext cx="0" cy="295395"/>
+          </a:xfrm>
+          <a:prstGeom prst="straightConnector1">
+            <a:avLst/>
+          </a:prstGeom>
+          <a:ln w="44450">
+            <a:tailEnd type="triangle"/>
+          </a:ln>
+        </p:spPr>
+        <p:style>
+          <a:lnRef idx="1">
+            <a:schemeClr val="dk1"/>
+          </a:lnRef>
+          <a:fillRef idx="0">
+            <a:schemeClr val="dk1"/>
+          </a:fillRef>
+          <a:effectRef idx="0">
+            <a:schemeClr val="dk1"/>
+          </a:effectRef>
+          <a:fontRef idx="minor">
+            <a:schemeClr val="tx1"/>
+          </a:fontRef>
+        </p:style>
+      </p:cxnSp>
+      <p:cxnSp>
+        <p:nvCxnSpPr>
+          <p:cNvPr id="40" name="Gerade Verbindung mit Pfeil 39"/>
+          <p:cNvCxnSpPr>
+            <a:endCxn id="28" idx="0"/>
+          </p:cNvCxnSpPr>
+          <p:nvPr/>
+        </p:nvCxnSpPr>
+        <p:spPr>
+          <a:xfrm>
+            <a:off x="1942979" y="3212464"/>
+            <a:ext cx="1" cy="658987"/>
+          </a:xfrm>
+          <a:prstGeom prst="straightConnector1">
+            <a:avLst/>
+          </a:prstGeom>
+          <a:ln w="44450">
+            <a:tailEnd type="triangle"/>
+          </a:ln>
+        </p:spPr>
+        <p:style>
+          <a:lnRef idx="1">
+            <a:schemeClr val="dk1"/>
+          </a:lnRef>
+          <a:fillRef idx="0">
+            <a:schemeClr val="dk1"/>
+          </a:fillRef>
+          <a:effectRef idx="0">
+            <a:schemeClr val="dk1"/>
+          </a:effectRef>
+          <a:fontRef idx="minor">
+            <a:schemeClr val="tx1"/>
+          </a:fontRef>
+        </p:style>
+      </p:cxnSp>
+      <p:cxnSp>
+        <p:nvCxnSpPr>
+          <p:cNvPr id="42" name="Gerade Verbindung mit Pfeil 41"/>
+          <p:cNvCxnSpPr/>
+          <p:nvPr/>
+        </p:nvCxnSpPr>
+        <p:spPr>
+          <a:xfrm flipV="1">
+            <a:off x="1773226" y="3336508"/>
+            <a:ext cx="0" cy="534943"/>
+          </a:xfrm>
+          <a:prstGeom prst="straightConnector1">
+            <a:avLst/>
+          </a:prstGeom>
+          <a:ln w="44450">
+            <a:solidFill>
+              <a:srgbClr val="FFFF00"/>
+            </a:solidFill>
+            <a:tailEnd type="triangle"/>
+          </a:ln>
+        </p:spPr>
+        <p:style>
+          <a:lnRef idx="3">
+            <a:schemeClr val="accent6"/>
+          </a:lnRef>
+          <a:fillRef idx="0">
+            <a:schemeClr val="accent6"/>
+          </a:fillRef>
+          <a:effectRef idx="2">
+            <a:schemeClr val="accent6"/>
+          </a:effectRef>
+          <a:fontRef idx="minor">
+            <a:schemeClr val="tx1"/>
+          </a:fontRef>
+        </p:style>
+      </p:cxnSp>
+      <p:sp>
+        <p:nvSpPr>
+          <p:cNvPr id="26" name="Textfeld 25"/>
+          <p:cNvSpPr txBox="1"/>
+          <p:nvPr/>
+        </p:nvSpPr>
+        <p:spPr>
+          <a:xfrm>
+            <a:off x="1200150" y="3075534"/>
+            <a:ext cx="2315209" cy="260974"/>
+          </a:xfrm>
+          <a:prstGeom prst="rect">
+            <a:avLst/>
+          </a:prstGeom>
+          <a:solidFill>
+            <a:schemeClr val="accent6"/>
+          </a:solidFill>
+          <a:ln>
+            <a:noFill/>
+          </a:ln>
+        </p:spPr>
+        <p:style>
+          <a:lnRef idx="0">
+            <a:scrgbClr r="0" g="0" b="0"/>
+          </a:lnRef>
+          <a:fillRef idx="0">
+            <a:scrgbClr r="0" g="0" b="0"/>
+          </a:fillRef>
+          <a:effectRef idx="0">
+            <a:scrgbClr r="0" g="0" b="0"/>
+          </a:effectRef>
+          <a:fontRef idx="minor">
+            <a:schemeClr val="lt1"/>
+          </a:fontRef>
+        </p:style>
+        <p:txBody>
+          <a:bodyPr wrap="none" rtlCol="0">
+            <a:normAutofit fontScale="70000" lnSpcReduction="20000"/>
+          </a:bodyPr>
+          <a:lstStyle/>
+          <a:p>
+            <a:pPr algn="ctr"/>
+            <a:r>
+              <a:rPr lang="de-DE" dirty="0"/>
+              <a:t>App</a:t>
+            </a:r>
+          </a:p>
+        </p:txBody>
+      </p:sp>
+      <p:cxnSp>
+        <p:nvCxnSpPr>
+          <p:cNvPr id="56" name="Gerade Verbindung mit Pfeil 55"/>
+          <p:cNvCxnSpPr/>
+          <p:nvPr/>
+        </p:nvCxnSpPr>
+        <p:spPr>
+          <a:xfrm>
+            <a:off x="2787295" y="4132425"/>
+            <a:ext cx="6471" cy="649125"/>
+          </a:xfrm>
+          <a:prstGeom prst="straightConnector1">
+            <a:avLst/>
+          </a:prstGeom>
+          <a:ln w="44450">
+            <a:tailEnd type="triangle"/>
+          </a:ln>
+        </p:spPr>
+        <p:style>
+          <a:lnRef idx="1">
+            <a:schemeClr val="accent4"/>
+          </a:lnRef>
+          <a:fillRef idx="0">
+            <a:schemeClr val="accent4"/>
+          </a:fillRef>
+          <a:effectRef idx="0">
+            <a:schemeClr val="accent4"/>
+          </a:effectRef>
+          <a:fontRef idx="minor">
+            <a:schemeClr val="tx1"/>
+          </a:fontRef>
+        </p:style>
+      </p:cxnSp>
+      <p:sp>
+        <p:nvSpPr>
+          <p:cNvPr id="57" name="Textfeld 56"/>
+          <p:cNvSpPr txBox="1"/>
+          <p:nvPr/>
+        </p:nvSpPr>
+        <p:spPr>
+          <a:xfrm>
+            <a:off x="4867964" y="2108153"/>
+            <a:ext cx="2668062" cy="2111422"/>
+          </a:xfrm>
+          <a:prstGeom prst="rect">
+            <a:avLst/>
+          </a:prstGeom>
+        </p:spPr>
+        <p:style>
+          <a:lnRef idx="1">
+            <a:schemeClr val="accent1"/>
+          </a:lnRef>
+          <a:fillRef idx="3">
+            <a:schemeClr val="accent1"/>
+          </a:fillRef>
+          <a:effectRef idx="2">
+            <a:schemeClr val="accent1"/>
+          </a:effectRef>
+          <a:fontRef idx="minor">
+            <a:schemeClr val="lt1"/>
+          </a:fontRef>
+        </p:style>
+        <p:txBody>
+          <a:bodyPr wrap="square" rtlCol="0">
+            <a:normAutofit/>
+          </a:bodyPr>
+          <a:lstStyle/>
+          <a:p>
+            <a:pPr algn="ctr"/>
+            <a:r>
+              <a:rPr lang="de-DE" sz="1400" dirty="0"/>
+              <a:t>Game </a:t>
+            </a:r>
+            <a:r>
+              <a:rPr lang="de-DE" sz="1400" dirty="0" err="1"/>
+              <a:t>of</a:t>
+            </a:r>
+            <a:r>
+              <a:rPr lang="de-DE" sz="1400" dirty="0"/>
+              <a:t> Colors</a:t>
+            </a:r>
+          </a:p>
+        </p:txBody>
+      </p:sp>
+      <p:sp>
+        <p:nvSpPr>
+          <p:cNvPr id="58" name="Textfeld 57"/>
+          <p:cNvSpPr txBox="1"/>
+          <p:nvPr/>
+        </p:nvSpPr>
+        <p:spPr>
+          <a:xfrm>
+            <a:off x="5034761" y="2529535"/>
+            <a:ext cx="2315209" cy="254820"/>
+          </a:xfrm>
+          <a:prstGeom prst="rect">
+            <a:avLst/>
+          </a:prstGeom>
+          <a:solidFill>
+            <a:schemeClr val="accent6"/>
+          </a:solidFill>
+          <a:ln>
+            <a:noFill/>
+          </a:ln>
+        </p:spPr>
+        <p:style>
+          <a:lnRef idx="0">
+            <a:scrgbClr r="0" g="0" b="0"/>
+          </a:lnRef>
+          <a:fillRef idx="0">
+            <a:scrgbClr r="0" g="0" b="0"/>
+          </a:fillRef>
+          <a:effectRef idx="0">
+            <a:scrgbClr r="0" g="0" b="0"/>
+          </a:effectRef>
+          <a:fontRef idx="minor">
+            <a:schemeClr val="lt1"/>
+          </a:fontRef>
+        </p:style>
+        <p:txBody>
+          <a:bodyPr wrap="none" rtlCol="0">
+            <a:normAutofit fontScale="70000" lnSpcReduction="20000"/>
+          </a:bodyPr>
+          <a:lstStyle/>
+          <a:p>
+            <a:pPr algn="ctr"/>
+            <a:r>
+              <a:rPr lang="de-DE" dirty="0"/>
+              <a:t>GUI</a:t>
+            </a:r>
+          </a:p>
+        </p:txBody>
+      </p:sp>
+      <p:sp>
+        <p:nvSpPr>
+          <p:cNvPr id="59" name="Textfeld 58"/>
+          <p:cNvSpPr txBox="1"/>
+          <p:nvPr/>
+        </p:nvSpPr>
+        <p:spPr>
+          <a:xfrm>
+            <a:off x="5034761" y="3621534"/>
+            <a:ext cx="2287268" cy="550416"/>
+          </a:xfrm>
+          <a:prstGeom prst="rect">
+            <a:avLst/>
+          </a:prstGeom>
+          <a:solidFill>
+            <a:schemeClr val="accent6"/>
+          </a:solidFill>
+          <a:ln>
+            <a:noFill/>
+          </a:ln>
+        </p:spPr>
+        <p:style>
+          <a:lnRef idx="0">
+            <a:scrgbClr r="0" g="0" b="0"/>
+          </a:lnRef>
+          <a:fillRef idx="0">
+            <a:scrgbClr r="0" g="0" b="0"/>
+          </a:fillRef>
+          <a:effectRef idx="0">
+            <a:scrgbClr r="0" g="0" b="0"/>
+          </a:effectRef>
+          <a:fontRef idx="minor">
+            <a:schemeClr val="lt1"/>
+          </a:fontRef>
+        </p:style>
+        <p:txBody>
+          <a:bodyPr wrap="none" rtlCol="0">
+            <a:normAutofit/>
+          </a:bodyPr>
+          <a:lstStyle/>
+          <a:p>
+            <a:pPr algn="ctr"/>
+            <a:r>
+              <a:rPr lang="de-DE" sz="1300" dirty="0"/>
+              <a:t>Net</a:t>
+            </a:r>
+          </a:p>
+        </p:txBody>
+      </p:sp>
+      <p:sp>
+        <p:nvSpPr>
+          <p:cNvPr id="60" name="Textfeld 59"/>
+          <p:cNvSpPr txBox="1"/>
+          <p:nvPr/>
+        </p:nvSpPr>
+        <p:spPr>
+          <a:xfrm>
+            <a:off x="5487078" y="3871451"/>
+            <a:ext cx="581025" cy="260974"/>
+          </a:xfrm>
+          <a:prstGeom prst="rect">
+            <a:avLst/>
+          </a:prstGeom>
+          <a:gradFill flip="none" rotWithShape="1">
+            <a:gsLst>
+              <a:gs pos="0">
+                <a:schemeClr val="dk1">
+                  <a:lumMod val="67000"/>
+                </a:schemeClr>
+              </a:gs>
+              <a:gs pos="48000">
+                <a:schemeClr val="dk1">
+                  <a:lumMod val="97000"/>
+                  <a:lumOff val="3000"/>
+                </a:schemeClr>
+              </a:gs>
+              <a:gs pos="100000">
+                <a:schemeClr val="dk1">
+                  <a:lumMod val="60000"/>
+                  <a:lumOff val="40000"/>
+                </a:schemeClr>
+              </a:gs>
+            </a:gsLst>
+            <a:lin ang="16200000" scaled="1"/>
+            <a:tileRect/>
+          </a:gradFill>
+          <a:ln>
+            <a:noFill/>
+          </a:ln>
+        </p:spPr>
+        <p:style>
+          <a:lnRef idx="0">
+            <a:scrgbClr r="0" g="0" b="0"/>
+          </a:lnRef>
+          <a:fillRef idx="0">
+            <a:scrgbClr r="0" g="0" b="0"/>
+          </a:fillRef>
+          <a:effectRef idx="0">
+            <a:scrgbClr r="0" g="0" b="0"/>
+          </a:effectRef>
+          <a:fontRef idx="minor">
+            <a:schemeClr val="lt1"/>
+          </a:fontRef>
+        </p:style>
+        <p:txBody>
+          <a:bodyPr wrap="none" rtlCol="0">
+            <a:normAutofit fontScale="70000" lnSpcReduction="20000"/>
+          </a:bodyPr>
+          <a:lstStyle/>
+          <a:p>
+            <a:pPr algn="ctr"/>
+            <a:r>
+              <a:rPr lang="de-DE" dirty="0"/>
+              <a:t>Client</a:t>
+            </a:r>
+          </a:p>
+        </p:txBody>
+      </p:sp>
+      <p:cxnSp>
+        <p:nvCxnSpPr>
+          <p:cNvPr id="62" name="Gerade Verbindung mit Pfeil 61"/>
+          <p:cNvCxnSpPr/>
+          <p:nvPr/>
+        </p:nvCxnSpPr>
+        <p:spPr>
+          <a:xfrm flipV="1">
+            <a:off x="5599881" y="2784355"/>
+            <a:ext cx="0" cy="285026"/>
+          </a:xfrm>
+          <a:prstGeom prst="straightConnector1">
+            <a:avLst/>
+          </a:prstGeom>
+          <a:ln w="44450">
+            <a:solidFill>
+              <a:srgbClr val="FFFF00"/>
+            </a:solidFill>
+            <a:tailEnd type="triangle"/>
+          </a:ln>
+        </p:spPr>
+        <p:style>
+          <a:lnRef idx="3">
+            <a:schemeClr val="accent6"/>
+          </a:lnRef>
+          <a:fillRef idx="0">
+            <a:schemeClr val="accent6"/>
+          </a:fillRef>
+          <a:effectRef idx="2">
+            <a:schemeClr val="accent6"/>
+          </a:effectRef>
+          <a:fontRef idx="minor">
+            <a:schemeClr val="tx1"/>
+          </a:fontRef>
+        </p:style>
+      </p:cxnSp>
+      <p:cxnSp>
+        <p:nvCxnSpPr>
+          <p:cNvPr id="63" name="Gerade Verbindung mit Pfeil 62"/>
+          <p:cNvCxnSpPr/>
+          <p:nvPr/>
+        </p:nvCxnSpPr>
+        <p:spPr>
+          <a:xfrm>
+            <a:off x="5777590" y="2784355"/>
+            <a:ext cx="0" cy="295395"/>
+          </a:xfrm>
+          <a:prstGeom prst="straightConnector1">
+            <a:avLst/>
+          </a:prstGeom>
+          <a:ln w="44450">
+            <a:tailEnd type="triangle"/>
+          </a:ln>
+        </p:spPr>
+        <p:style>
+          <a:lnRef idx="1">
+            <a:schemeClr val="dk1"/>
+          </a:lnRef>
+          <a:fillRef idx="0">
+            <a:schemeClr val="dk1"/>
+          </a:fillRef>
+          <a:effectRef idx="0">
+            <a:schemeClr val="dk1"/>
+          </a:effectRef>
+          <a:fontRef idx="minor">
+            <a:schemeClr val="tx1"/>
+          </a:fontRef>
+        </p:style>
+      </p:cxnSp>
+      <p:cxnSp>
+        <p:nvCxnSpPr>
+          <p:cNvPr id="64" name="Gerade Verbindung mit Pfeil 63"/>
+          <p:cNvCxnSpPr>
+            <a:endCxn id="60" idx="0"/>
+          </p:cNvCxnSpPr>
+          <p:nvPr/>
+        </p:nvCxnSpPr>
+        <p:spPr>
+          <a:xfrm>
+            <a:off x="5777590" y="3212464"/>
+            <a:ext cx="1" cy="658987"/>
+          </a:xfrm>
+          <a:prstGeom prst="straightConnector1">
+            <a:avLst/>
+          </a:prstGeom>
+          <a:ln w="44450">
+            <a:tailEnd type="triangle"/>
+          </a:ln>
+        </p:spPr>
+        <p:style>
+          <a:lnRef idx="1">
+            <a:schemeClr val="dk1"/>
+          </a:lnRef>
+          <a:fillRef idx="0">
+            <a:schemeClr val="dk1"/>
+          </a:fillRef>
+          <a:effectRef idx="0">
+            <a:schemeClr val="dk1"/>
+          </a:effectRef>
+          <a:fontRef idx="minor">
+            <a:schemeClr val="tx1"/>
+          </a:fontRef>
+        </p:style>
+      </p:cxnSp>
+      <p:cxnSp>
+        <p:nvCxnSpPr>
+          <p:cNvPr id="65" name="Gerade Verbindung mit Pfeil 64"/>
+          <p:cNvCxnSpPr/>
+          <p:nvPr/>
+        </p:nvCxnSpPr>
+        <p:spPr>
+          <a:xfrm flipV="1">
+            <a:off x="5607835" y="3336508"/>
+            <a:ext cx="0" cy="534943"/>
+          </a:xfrm>
+          <a:prstGeom prst="straightConnector1">
+            <a:avLst/>
+          </a:prstGeom>
+          <a:ln w="44450">
+            <a:solidFill>
+              <a:srgbClr val="FFFF00"/>
+            </a:solidFill>
+            <a:tailEnd type="triangle"/>
+          </a:ln>
+        </p:spPr>
+        <p:style>
+          <a:lnRef idx="3">
+            <a:schemeClr val="accent6"/>
+          </a:lnRef>
+          <a:fillRef idx="0">
+            <a:schemeClr val="accent6"/>
+          </a:fillRef>
+          <a:effectRef idx="2">
+            <a:schemeClr val="accent6"/>
+          </a:effectRef>
+          <a:fontRef idx="minor">
+            <a:schemeClr val="tx1"/>
+          </a:fontRef>
+        </p:style>
+      </p:cxnSp>
+      <p:sp>
+        <p:nvSpPr>
+          <p:cNvPr id="67" name="Textfeld 66"/>
+          <p:cNvSpPr txBox="1"/>
+          <p:nvPr/>
+        </p:nvSpPr>
+        <p:spPr>
+          <a:xfrm>
+            <a:off x="5034761" y="3075534"/>
+            <a:ext cx="2315209" cy="260974"/>
+          </a:xfrm>
+          <a:prstGeom prst="rect">
+            <a:avLst/>
+          </a:prstGeom>
+          <a:solidFill>
+            <a:schemeClr val="accent6"/>
+          </a:solidFill>
+          <a:ln>
+            <a:noFill/>
+          </a:ln>
+        </p:spPr>
+        <p:style>
+          <a:lnRef idx="0">
+            <a:scrgbClr r="0" g="0" b="0"/>
+          </a:lnRef>
+          <a:fillRef idx="0">
+            <a:scrgbClr r="0" g="0" b="0"/>
+          </a:fillRef>
+          <a:effectRef idx="0">
+            <a:scrgbClr r="0" g="0" b="0"/>
+          </a:effectRef>
+          <a:fontRef idx="minor">
+            <a:schemeClr val="lt1"/>
+          </a:fontRef>
+        </p:style>
+        <p:txBody>
+          <a:bodyPr wrap="none" rtlCol="0">
+            <a:normAutofit fontScale="70000" lnSpcReduction="20000"/>
+          </a:bodyPr>
+          <a:lstStyle/>
+          <a:p>
+            <a:pPr algn="ctr"/>
+            <a:r>
+              <a:rPr lang="de-DE" dirty="0"/>
+              <a:t>App</a:t>
+            </a:r>
+          </a:p>
+        </p:txBody>
+      </p:sp>
+      <p:sp>
+        <p:nvSpPr>
+          <p:cNvPr id="68" name="Textfeld 67"/>
+          <p:cNvSpPr txBox="1"/>
+          <p:nvPr/>
+        </p:nvSpPr>
+        <p:spPr>
+          <a:xfrm>
+            <a:off x="8702575" y="2108153"/>
+            <a:ext cx="2668062" cy="2111422"/>
+          </a:xfrm>
+          <a:prstGeom prst="rect">
+            <a:avLst/>
+          </a:prstGeom>
+        </p:spPr>
+        <p:style>
+          <a:lnRef idx="1">
+            <a:schemeClr val="accent1"/>
+          </a:lnRef>
+          <a:fillRef idx="3">
+            <a:schemeClr val="accent1"/>
+          </a:fillRef>
+          <a:effectRef idx="2">
+            <a:schemeClr val="accent1"/>
+          </a:effectRef>
+          <a:fontRef idx="minor">
+            <a:schemeClr val="lt1"/>
+          </a:fontRef>
+        </p:style>
+        <p:txBody>
+          <a:bodyPr wrap="square" rtlCol="0">
+            <a:normAutofit/>
+          </a:bodyPr>
+          <a:lstStyle/>
+          <a:p>
+            <a:pPr algn="ctr"/>
+            <a:r>
+              <a:rPr lang="de-DE" sz="1400" dirty="0"/>
+              <a:t>Game </a:t>
+            </a:r>
+            <a:r>
+              <a:rPr lang="de-DE" sz="1400" dirty="0" err="1"/>
+              <a:t>of</a:t>
+            </a:r>
+            <a:r>
+              <a:rPr lang="de-DE" sz="1400" dirty="0"/>
+              <a:t> Colors</a:t>
+            </a:r>
+          </a:p>
+        </p:txBody>
+      </p:sp>
+      <p:sp>
+        <p:nvSpPr>
+          <p:cNvPr id="69" name="Textfeld 68"/>
+          <p:cNvSpPr txBox="1"/>
+          <p:nvPr/>
+        </p:nvSpPr>
+        <p:spPr>
+          <a:xfrm>
+            <a:off x="8869372" y="2529535"/>
+            <a:ext cx="2315209" cy="254820"/>
+          </a:xfrm>
+          <a:prstGeom prst="rect">
+            <a:avLst/>
+          </a:prstGeom>
+          <a:solidFill>
+            <a:schemeClr val="accent6"/>
+          </a:solidFill>
+          <a:ln>
+            <a:noFill/>
+          </a:ln>
+        </p:spPr>
+        <p:style>
+          <a:lnRef idx="0">
+            <a:scrgbClr r="0" g="0" b="0"/>
+          </a:lnRef>
+          <a:fillRef idx="0">
+            <a:scrgbClr r="0" g="0" b="0"/>
+          </a:fillRef>
+          <a:effectRef idx="0">
+            <a:scrgbClr r="0" g="0" b="0"/>
+          </a:effectRef>
+          <a:fontRef idx="minor">
+            <a:schemeClr val="lt1"/>
+          </a:fontRef>
+        </p:style>
+        <p:txBody>
+          <a:bodyPr wrap="none" rtlCol="0">
+            <a:normAutofit fontScale="70000" lnSpcReduction="20000"/>
+          </a:bodyPr>
+          <a:lstStyle/>
+          <a:p>
+            <a:pPr algn="ctr"/>
+            <a:r>
+              <a:rPr lang="de-DE" dirty="0"/>
+              <a:t>GUI</a:t>
+            </a:r>
+          </a:p>
+        </p:txBody>
+      </p:sp>
+      <p:sp>
+        <p:nvSpPr>
+          <p:cNvPr id="70" name="Textfeld 69"/>
+          <p:cNvSpPr txBox="1"/>
+          <p:nvPr/>
+        </p:nvSpPr>
+        <p:spPr>
+          <a:xfrm>
+            <a:off x="8869372" y="3621534"/>
+            <a:ext cx="2287268" cy="550416"/>
+          </a:xfrm>
+          <a:prstGeom prst="rect">
+            <a:avLst/>
+          </a:prstGeom>
+          <a:solidFill>
+            <a:schemeClr val="accent6"/>
+          </a:solidFill>
+          <a:ln>
+            <a:noFill/>
+          </a:ln>
+        </p:spPr>
+        <p:style>
+          <a:lnRef idx="0">
+            <a:scrgbClr r="0" g="0" b="0"/>
+          </a:lnRef>
+          <a:fillRef idx="0">
+            <a:scrgbClr r="0" g="0" b="0"/>
+          </a:fillRef>
+          <a:effectRef idx="0">
+            <a:scrgbClr r="0" g="0" b="0"/>
+          </a:effectRef>
+          <a:fontRef idx="minor">
+            <a:schemeClr val="lt1"/>
+          </a:fontRef>
+        </p:style>
+        <p:txBody>
+          <a:bodyPr wrap="none" rtlCol="0">
+            <a:normAutofit/>
+          </a:bodyPr>
+          <a:lstStyle/>
+          <a:p>
+            <a:pPr algn="ctr"/>
+            <a:r>
+              <a:rPr lang="de-DE" sz="1300" dirty="0"/>
+              <a:t>Net</a:t>
+            </a:r>
+          </a:p>
+        </p:txBody>
+      </p:sp>
+      <p:sp>
+        <p:nvSpPr>
+          <p:cNvPr id="71" name="Textfeld 70"/>
+          <p:cNvSpPr txBox="1"/>
+          <p:nvPr/>
+        </p:nvSpPr>
+        <p:spPr>
+          <a:xfrm>
+            <a:off x="9321689" y="3871451"/>
+            <a:ext cx="581025" cy="260974"/>
+          </a:xfrm>
+          <a:prstGeom prst="rect">
+            <a:avLst/>
+          </a:prstGeom>
+          <a:gradFill flip="none" rotWithShape="1">
+            <a:gsLst>
+              <a:gs pos="0">
+                <a:schemeClr val="dk1">
+                  <a:lumMod val="67000"/>
+                </a:schemeClr>
+              </a:gs>
+              <a:gs pos="48000">
+                <a:schemeClr val="dk1">
+                  <a:lumMod val="97000"/>
+                  <a:lumOff val="3000"/>
+                </a:schemeClr>
+              </a:gs>
+              <a:gs pos="100000">
+                <a:schemeClr val="dk1">
+                  <a:lumMod val="60000"/>
+                  <a:lumOff val="40000"/>
+                </a:schemeClr>
+              </a:gs>
+            </a:gsLst>
+            <a:lin ang="16200000" scaled="1"/>
+            <a:tileRect/>
+          </a:gradFill>
+          <a:ln>
+            <a:noFill/>
+          </a:ln>
+        </p:spPr>
+        <p:style>
+          <a:lnRef idx="0">
+            <a:scrgbClr r="0" g="0" b="0"/>
+          </a:lnRef>
+          <a:fillRef idx="0">
+            <a:scrgbClr r="0" g="0" b="0"/>
+          </a:fillRef>
+          <a:effectRef idx="0">
+            <a:scrgbClr r="0" g="0" b="0"/>
+          </a:effectRef>
+          <a:fontRef idx="minor">
+            <a:schemeClr val="lt1"/>
+          </a:fontRef>
+        </p:style>
+        <p:txBody>
+          <a:bodyPr wrap="none" rtlCol="0">
+            <a:normAutofit fontScale="70000" lnSpcReduction="20000"/>
+          </a:bodyPr>
+          <a:lstStyle/>
+          <a:p>
+            <a:pPr algn="ctr"/>
+            <a:r>
+              <a:rPr lang="de-DE" dirty="0"/>
+              <a:t>Client</a:t>
+            </a:r>
+          </a:p>
+        </p:txBody>
+      </p:sp>
+      <p:cxnSp>
+        <p:nvCxnSpPr>
+          <p:cNvPr id="73" name="Gerade Verbindung mit Pfeil 72"/>
+          <p:cNvCxnSpPr/>
+          <p:nvPr/>
+        </p:nvCxnSpPr>
+        <p:spPr>
+          <a:xfrm flipV="1">
+            <a:off x="9442446" y="2784355"/>
+            <a:ext cx="0" cy="285026"/>
+          </a:xfrm>
+          <a:prstGeom prst="straightConnector1">
+            <a:avLst/>
+          </a:prstGeom>
+          <a:ln w="44450">
+            <a:solidFill>
+              <a:srgbClr val="FFFF00"/>
+            </a:solidFill>
+            <a:tailEnd type="triangle"/>
+          </a:ln>
+        </p:spPr>
+        <p:style>
+          <a:lnRef idx="3">
+            <a:schemeClr val="accent6"/>
+          </a:lnRef>
+          <a:fillRef idx="0">
+            <a:schemeClr val="accent6"/>
+          </a:fillRef>
+          <a:effectRef idx="2">
+            <a:schemeClr val="accent6"/>
+          </a:effectRef>
+          <a:fontRef idx="minor">
+            <a:schemeClr val="tx1"/>
+          </a:fontRef>
+        </p:style>
+      </p:cxnSp>
+      <p:cxnSp>
+        <p:nvCxnSpPr>
+          <p:cNvPr id="74" name="Gerade Verbindung mit Pfeil 73"/>
+          <p:cNvCxnSpPr/>
+          <p:nvPr/>
+        </p:nvCxnSpPr>
+        <p:spPr>
+          <a:xfrm>
+            <a:off x="9612201" y="2784355"/>
+            <a:ext cx="0" cy="295395"/>
+          </a:xfrm>
+          <a:prstGeom prst="straightConnector1">
+            <a:avLst/>
+          </a:prstGeom>
+          <a:ln w="44450">
+            <a:tailEnd type="triangle"/>
+          </a:ln>
+        </p:spPr>
+        <p:style>
+          <a:lnRef idx="1">
+            <a:schemeClr val="dk1"/>
+          </a:lnRef>
+          <a:fillRef idx="0">
+            <a:schemeClr val="dk1"/>
+          </a:fillRef>
+          <a:effectRef idx="0">
+            <a:schemeClr val="dk1"/>
+          </a:effectRef>
+          <a:fontRef idx="minor">
+            <a:schemeClr val="tx1"/>
+          </a:fontRef>
+        </p:style>
+      </p:cxnSp>
+      <p:cxnSp>
+        <p:nvCxnSpPr>
+          <p:cNvPr id="75" name="Gerade Verbindung mit Pfeil 74"/>
+          <p:cNvCxnSpPr>
+            <a:endCxn id="71" idx="0"/>
+          </p:cNvCxnSpPr>
+          <p:nvPr/>
+        </p:nvCxnSpPr>
+        <p:spPr>
+          <a:xfrm>
+            <a:off x="9612201" y="3212464"/>
+            <a:ext cx="1" cy="658987"/>
+          </a:xfrm>
+          <a:prstGeom prst="straightConnector1">
+            <a:avLst/>
+          </a:prstGeom>
+          <a:ln w="44450">
+            <a:tailEnd type="triangle"/>
+          </a:ln>
+        </p:spPr>
+        <p:style>
+          <a:lnRef idx="1">
+            <a:schemeClr val="dk1"/>
+          </a:lnRef>
+          <a:fillRef idx="0">
+            <a:schemeClr val="dk1"/>
+          </a:fillRef>
+          <a:effectRef idx="0">
+            <a:schemeClr val="dk1"/>
+          </a:effectRef>
+          <a:fontRef idx="minor">
+            <a:schemeClr val="tx1"/>
+          </a:fontRef>
+        </p:style>
+      </p:cxnSp>
+      <p:cxnSp>
+        <p:nvCxnSpPr>
+          <p:cNvPr id="76" name="Gerade Verbindung mit Pfeil 75"/>
+          <p:cNvCxnSpPr/>
+          <p:nvPr/>
+        </p:nvCxnSpPr>
+        <p:spPr>
+          <a:xfrm flipV="1">
+            <a:off x="9442446" y="3336508"/>
+            <a:ext cx="0" cy="534943"/>
+          </a:xfrm>
+          <a:prstGeom prst="straightConnector1">
+            <a:avLst/>
+          </a:prstGeom>
+          <a:ln w="44450">
+            <a:solidFill>
+              <a:srgbClr val="FFFF00"/>
+            </a:solidFill>
+            <a:tailEnd type="triangle"/>
+          </a:ln>
+        </p:spPr>
+        <p:style>
+          <a:lnRef idx="3">
+            <a:schemeClr val="accent6"/>
+          </a:lnRef>
+          <a:fillRef idx="0">
+            <a:schemeClr val="accent6"/>
+          </a:fillRef>
+          <a:effectRef idx="2">
+            <a:schemeClr val="accent6"/>
+          </a:effectRef>
+          <a:fontRef idx="minor">
+            <a:schemeClr val="tx1"/>
+          </a:fontRef>
+        </p:style>
+      </p:cxnSp>
+      <p:sp>
+        <p:nvSpPr>
+          <p:cNvPr id="78" name="Textfeld 77"/>
+          <p:cNvSpPr txBox="1"/>
+          <p:nvPr/>
+        </p:nvSpPr>
+        <p:spPr>
+          <a:xfrm>
+            <a:off x="8869372" y="3075534"/>
+            <a:ext cx="2315209" cy="260974"/>
+          </a:xfrm>
+          <a:prstGeom prst="rect">
+            <a:avLst/>
+          </a:prstGeom>
+          <a:solidFill>
+            <a:schemeClr val="accent6"/>
+          </a:solidFill>
+          <a:ln>
+            <a:noFill/>
+          </a:ln>
+        </p:spPr>
+        <p:style>
+          <a:lnRef idx="0">
+            <a:scrgbClr r="0" g="0" b="0"/>
+          </a:lnRef>
+          <a:fillRef idx="0">
+            <a:scrgbClr r="0" g="0" b="0"/>
+          </a:fillRef>
+          <a:effectRef idx="0">
+            <a:scrgbClr r="0" g="0" b="0"/>
+          </a:effectRef>
+          <a:fontRef idx="minor">
+            <a:schemeClr val="lt1"/>
+          </a:fontRef>
+        </p:style>
+        <p:txBody>
+          <a:bodyPr wrap="none" rtlCol="0">
+            <a:normAutofit fontScale="70000" lnSpcReduction="20000"/>
+          </a:bodyPr>
+          <a:lstStyle/>
+          <a:p>
+            <a:pPr algn="ctr"/>
+            <a:r>
+              <a:rPr lang="de-DE" dirty="0"/>
+              <a:t>App</a:t>
+            </a:r>
+          </a:p>
+        </p:txBody>
+      </p:sp>
+      <p:cxnSp>
+        <p:nvCxnSpPr>
+          <p:cNvPr id="84" name="Gerade Verbindung mit Pfeil 83"/>
+          <p:cNvCxnSpPr/>
+          <p:nvPr/>
+        </p:nvCxnSpPr>
+        <p:spPr>
+          <a:xfrm>
+            <a:off x="5785540" y="4121368"/>
+            <a:ext cx="0" cy="435134"/>
+          </a:xfrm>
+          <a:prstGeom prst="straightConnector1">
+            <a:avLst/>
+          </a:prstGeom>
+          <a:ln w="44450">
+            <a:tailEnd type="triangle"/>
+          </a:ln>
+        </p:spPr>
+        <p:style>
+          <a:lnRef idx="1">
+            <a:schemeClr val="accent4"/>
+          </a:lnRef>
+          <a:fillRef idx="0">
+            <a:schemeClr val="accent4"/>
+          </a:fillRef>
+          <a:effectRef idx="0">
+            <a:schemeClr val="accent4"/>
+          </a:effectRef>
+          <a:fontRef idx="minor">
+            <a:schemeClr val="tx1"/>
+          </a:fontRef>
+        </p:style>
+      </p:cxnSp>
+      <p:sp>
+        <p:nvSpPr>
+          <p:cNvPr id="86" name="Textfeld 85"/>
+          <p:cNvSpPr txBox="1"/>
+          <p:nvPr/>
+        </p:nvSpPr>
+        <p:spPr>
+          <a:xfrm rot="19773791">
+            <a:off x="650026" y="1932842"/>
+            <a:ext cx="766653" cy="369332"/>
+          </a:xfrm>
+          <a:prstGeom prst="rect">
+            <a:avLst/>
+          </a:prstGeom>
+        </p:spPr>
+        <p:style>
+          <a:lnRef idx="1">
+            <a:schemeClr val="accent3"/>
+          </a:lnRef>
+          <a:fillRef idx="3">
+            <a:schemeClr val="accent3"/>
+          </a:fillRef>
+          <a:effectRef idx="2">
+            <a:schemeClr val="accent3"/>
+          </a:effectRef>
+          <a:fontRef idx="minor">
+            <a:schemeClr val="lt1"/>
+          </a:fontRef>
+        </p:style>
+        <p:txBody>
+          <a:bodyPr wrap="square" rtlCol="0">
+            <a:spAutoFit/>
+          </a:bodyPr>
+          <a:lstStyle/>
+          <a:p>
+            <a:pPr algn="ctr"/>
+            <a:r>
+              <a:rPr lang="de-DE" dirty="0"/>
+              <a:t>Host</a:t>
+            </a:r>
+          </a:p>
+        </p:txBody>
+      </p:sp>
+      <p:cxnSp>
+        <p:nvCxnSpPr>
+          <p:cNvPr id="88" name="Gerade Verbindung mit Pfeil 87"/>
+          <p:cNvCxnSpPr/>
+          <p:nvPr/>
+        </p:nvCxnSpPr>
+        <p:spPr>
+          <a:xfrm>
+            <a:off x="9612201" y="4132425"/>
+            <a:ext cx="0" cy="435134"/>
+          </a:xfrm>
+          <a:prstGeom prst="straightConnector1">
+            <a:avLst/>
+          </a:prstGeom>
+          <a:ln w="44450">
+            <a:tailEnd type="triangle"/>
+          </a:ln>
+        </p:spPr>
+        <p:style>
+          <a:lnRef idx="1">
+            <a:schemeClr val="accent4"/>
+          </a:lnRef>
+          <a:fillRef idx="0">
+            <a:schemeClr val="accent4"/>
+          </a:fillRef>
+          <a:effectRef idx="0">
+            <a:schemeClr val="accent4"/>
+          </a:effectRef>
+          <a:fontRef idx="minor">
+            <a:schemeClr val="tx1"/>
+          </a:fontRef>
+        </p:style>
+      </p:cxnSp>
+      <p:cxnSp>
+        <p:nvCxnSpPr>
+          <p:cNvPr id="91" name="Gerade Verbindung mit Pfeil 90"/>
+          <p:cNvCxnSpPr/>
+          <p:nvPr/>
+        </p:nvCxnSpPr>
+        <p:spPr>
+          <a:xfrm flipV="1">
+            <a:off x="2934115" y="4109108"/>
+            <a:ext cx="5518" cy="482107"/>
+          </a:xfrm>
+          <a:prstGeom prst="straightConnector1">
+            <a:avLst/>
+          </a:prstGeom>
+          <a:ln w="44450">
+            <a:tailEnd type="triangle"/>
+          </a:ln>
+        </p:spPr>
+        <p:style>
+          <a:lnRef idx="1">
+            <a:schemeClr val="accent4"/>
+          </a:lnRef>
+          <a:fillRef idx="0">
+            <a:schemeClr val="accent4"/>
+          </a:fillRef>
+          <a:effectRef idx="0">
+            <a:schemeClr val="accent4"/>
+          </a:effectRef>
+          <a:fontRef idx="minor">
+            <a:schemeClr val="tx1"/>
+          </a:fontRef>
+        </p:style>
+      </p:cxnSp>
+      <p:cxnSp>
+        <p:nvCxnSpPr>
+          <p:cNvPr id="94" name="Gerade Verbindung mit Pfeil 93"/>
+          <p:cNvCxnSpPr/>
+          <p:nvPr/>
+        </p:nvCxnSpPr>
+        <p:spPr>
+          <a:xfrm flipH="1" flipV="1">
+            <a:off x="2973491" y="4563626"/>
+            <a:ext cx="6638711" cy="33141"/>
+          </a:xfrm>
+          <a:prstGeom prst="straightConnector1">
+            <a:avLst/>
+          </a:prstGeom>
+          <a:ln w="44450">
+            <a:tailEnd type="triangle"/>
+          </a:ln>
+        </p:spPr>
+        <p:style>
+          <a:lnRef idx="1">
+            <a:schemeClr val="accent4"/>
+          </a:lnRef>
+          <a:fillRef idx="0">
+            <a:schemeClr val="accent4"/>
+          </a:fillRef>
+          <a:effectRef idx="0">
+            <a:schemeClr val="accent4"/>
+          </a:effectRef>
+          <a:fontRef idx="minor">
+            <a:schemeClr val="tx1"/>
+          </a:fontRef>
+        </p:style>
+      </p:cxnSp>
+      <p:cxnSp>
+        <p:nvCxnSpPr>
+          <p:cNvPr id="98" name="Gerade Verbindung mit Pfeil 97"/>
+          <p:cNvCxnSpPr/>
+          <p:nvPr/>
+        </p:nvCxnSpPr>
+        <p:spPr>
+          <a:xfrm>
+            <a:off x="2793766" y="4806089"/>
+            <a:ext cx="2806115" cy="2776"/>
+          </a:xfrm>
+          <a:prstGeom prst="straightConnector1">
+            <a:avLst/>
+          </a:prstGeom>
+          <a:ln w="44450">
+            <a:tailEnd type="triangle"/>
+          </a:ln>
+        </p:spPr>
+        <p:style>
+          <a:lnRef idx="1">
+            <a:schemeClr val="accent4"/>
+          </a:lnRef>
+          <a:fillRef idx="0">
+            <a:schemeClr val="accent4"/>
+          </a:fillRef>
+          <a:effectRef idx="0">
+            <a:schemeClr val="accent4"/>
+          </a:effectRef>
+          <a:fontRef idx="minor">
+            <a:schemeClr val="tx1"/>
+          </a:fontRef>
+        </p:style>
+      </p:cxnSp>
+      <p:cxnSp>
+        <p:nvCxnSpPr>
+          <p:cNvPr id="101" name="Gerade Verbindung mit Pfeil 100"/>
+          <p:cNvCxnSpPr/>
+          <p:nvPr/>
+        </p:nvCxnSpPr>
+        <p:spPr>
+          <a:xfrm>
+            <a:off x="5607835" y="4806089"/>
+            <a:ext cx="3834611" cy="0"/>
+          </a:xfrm>
+          <a:prstGeom prst="straightConnector1">
+            <a:avLst/>
+          </a:prstGeom>
+          <a:ln w="44450">
+            <a:tailEnd type="triangle"/>
+          </a:ln>
+        </p:spPr>
+        <p:style>
+          <a:lnRef idx="1">
+            <a:schemeClr val="accent4"/>
+          </a:lnRef>
+          <a:fillRef idx="0">
+            <a:schemeClr val="accent4"/>
+          </a:fillRef>
+          <a:effectRef idx="0">
+            <a:schemeClr val="accent4"/>
+          </a:effectRef>
+          <a:fontRef idx="minor">
+            <a:schemeClr val="tx1"/>
+          </a:fontRef>
+        </p:style>
+      </p:cxnSp>
+      <p:cxnSp>
+        <p:nvCxnSpPr>
+          <p:cNvPr id="103" name="Gerade Verbindung mit Pfeil 102"/>
+          <p:cNvCxnSpPr/>
+          <p:nvPr/>
+        </p:nvCxnSpPr>
+        <p:spPr>
+          <a:xfrm flipV="1">
+            <a:off x="5591375" y="4141289"/>
+            <a:ext cx="5518" cy="680533"/>
+          </a:xfrm>
+          <a:prstGeom prst="straightConnector1">
+            <a:avLst/>
+          </a:prstGeom>
+          <a:ln w="44450">
+            <a:tailEnd type="triangle"/>
+          </a:ln>
+        </p:spPr>
+        <p:style>
+          <a:lnRef idx="1">
+            <a:schemeClr val="accent4"/>
+          </a:lnRef>
+          <a:fillRef idx="0">
+            <a:schemeClr val="accent4"/>
+          </a:fillRef>
+          <a:effectRef idx="0">
+            <a:schemeClr val="accent4"/>
+          </a:effectRef>
+          <a:fontRef idx="minor">
+            <a:schemeClr val="tx1"/>
+          </a:fontRef>
+        </p:style>
+      </p:cxnSp>
+      <p:cxnSp>
+        <p:nvCxnSpPr>
+          <p:cNvPr id="105" name="Gerade Verbindung mit Pfeil 104"/>
+          <p:cNvCxnSpPr/>
+          <p:nvPr/>
+        </p:nvCxnSpPr>
+        <p:spPr>
+          <a:xfrm flipV="1">
+            <a:off x="9442446" y="4102583"/>
+            <a:ext cx="5518" cy="680533"/>
+          </a:xfrm>
+          <a:prstGeom prst="straightConnector1">
+            <a:avLst/>
+          </a:prstGeom>
+          <a:ln w="44450">
+            <a:tailEnd type="triangle"/>
+          </a:ln>
+        </p:spPr>
+        <p:style>
+          <a:lnRef idx="1">
+            <a:schemeClr val="accent4"/>
+          </a:lnRef>
+          <a:fillRef idx="0">
+            <a:schemeClr val="accent4"/>
+          </a:fillRef>
+          <a:effectRef idx="0">
+            <a:schemeClr val="accent4"/>
+          </a:effectRef>
+          <a:fontRef idx="minor">
+            <a:schemeClr val="tx1"/>
+          </a:fontRef>
+        </p:style>
+      </p:cxnSp>
+      <p:cxnSp>
+        <p:nvCxnSpPr>
+          <p:cNvPr id="107" name="Gerade Verbindung mit Pfeil 106"/>
+          <p:cNvCxnSpPr/>
+          <p:nvPr/>
+        </p:nvCxnSpPr>
+        <p:spPr>
+          <a:xfrm flipV="1">
+            <a:off x="3076488" y="5876014"/>
+            <a:ext cx="2410590" cy="12049"/>
+          </a:xfrm>
+          <a:prstGeom prst="straightConnector1">
+            <a:avLst/>
+          </a:prstGeom>
+          <a:ln w="44450">
+            <a:tailEnd type="triangle"/>
+          </a:ln>
+        </p:spPr>
+        <p:style>
+          <a:lnRef idx="1">
+            <a:schemeClr val="accent4"/>
+          </a:lnRef>
+          <a:fillRef idx="0">
+            <a:schemeClr val="accent4"/>
+          </a:fillRef>
+          <a:effectRef idx="0">
+            <a:schemeClr val="accent4"/>
+          </a:effectRef>
+          <a:fontRef idx="minor">
+            <a:schemeClr val="tx1"/>
+          </a:fontRef>
+        </p:style>
+      </p:cxnSp>
+      <p:cxnSp>
+        <p:nvCxnSpPr>
+          <p:cNvPr id="122" name="Gerade Verbindung mit Pfeil 121"/>
+          <p:cNvCxnSpPr/>
+          <p:nvPr/>
+        </p:nvCxnSpPr>
+        <p:spPr>
+          <a:xfrm>
+            <a:off x="3076488" y="5424825"/>
+            <a:ext cx="2410590" cy="5916"/>
+          </a:xfrm>
+          <a:prstGeom prst="straightConnector1">
+            <a:avLst/>
+          </a:prstGeom>
+          <a:ln w="44450">
+            <a:solidFill>
+              <a:srgbClr val="FFFF00"/>
+            </a:solidFill>
+            <a:tailEnd type="triangle"/>
+          </a:ln>
+        </p:spPr>
+        <p:style>
+          <a:lnRef idx="3">
+            <a:schemeClr val="accent6"/>
+          </a:lnRef>
+          <a:fillRef idx="0">
+            <a:schemeClr val="accent6"/>
+          </a:fillRef>
+          <a:effectRef idx="2">
+            <a:schemeClr val="accent6"/>
+          </a:effectRef>
+          <a:fontRef idx="minor">
+            <a:schemeClr val="tx1"/>
+          </a:fontRef>
+        </p:style>
+      </p:cxnSp>
+      <p:cxnSp>
+        <p:nvCxnSpPr>
+          <p:cNvPr id="123" name="Gerade Verbindung mit Pfeil 122"/>
+          <p:cNvCxnSpPr/>
+          <p:nvPr/>
+        </p:nvCxnSpPr>
+        <p:spPr>
+          <a:xfrm>
+            <a:off x="3076488" y="5653377"/>
+            <a:ext cx="2410590" cy="0"/>
+          </a:xfrm>
+          <a:prstGeom prst="straightConnector1">
+            <a:avLst/>
+          </a:prstGeom>
+          <a:ln w="44450">
+            <a:tailEnd type="triangle"/>
+          </a:ln>
+        </p:spPr>
+        <p:style>
+          <a:lnRef idx="1">
+            <a:schemeClr val="dk1"/>
+          </a:lnRef>
+          <a:fillRef idx="0">
+            <a:schemeClr val="dk1"/>
+          </a:fillRef>
+          <a:effectRef idx="0">
+            <a:schemeClr val="dk1"/>
+          </a:effectRef>
+          <a:fontRef idx="minor">
+            <a:schemeClr val="tx1"/>
+          </a:fontRef>
+        </p:style>
+      </p:cxnSp>
+      <p:sp>
+        <p:nvSpPr>
+          <p:cNvPr id="130" name="Inhaltsplatzhalter 2"/>
+          <p:cNvSpPr txBox="1">
+            <a:spLocks/>
+          </p:cNvSpPr>
+          <p:nvPr/>
+        </p:nvSpPr>
+        <p:spPr>
+          <a:xfrm>
+            <a:off x="6376947" y="4940818"/>
+            <a:ext cx="5648736" cy="1089121"/>
+          </a:xfrm>
+          <a:prstGeom prst="rect">
+            <a:avLst/>
+          </a:prstGeom>
+        </p:spPr>
+        <p:txBody>
+          <a:bodyPr vert="horz" lIns="91440" tIns="45720" rIns="91440" bIns="45720" rtlCol="0" anchor="t">
+            <a:noAutofit/>
+          </a:bodyPr>
+          <a:lstStyle>
+            <a:lvl1pPr marL="228600" indent="-228600" algn="l" defTabSz="914400" rtl="0" eaLnBrk="1" latinLnBrk="0" hangingPunct="1">
+              <a:lnSpc>
+                <a:spcPct val="120000"/>
+              </a:lnSpc>
+              <a:spcBef>
+                <a:spcPts val="1000"/>
+              </a:spcBef>
+              <a:buClr>
+                <a:schemeClr val="accent1"/>
+              </a:buClr>
+              <a:buSzPct val="100000"/>
+              <a:buFont typeface="Arial" panose="020B0604020202020204" pitchFamily="34" charset="0"/>
+              <a:buChar char="•"/>
+              <a:defRPr sz="2000" kern="1200">
+                <a:solidFill>
+                  <a:schemeClr val="tx1"/>
+                </a:solidFill>
+                <a:effectLst/>
+                <a:latin typeface="+mn-lt"/>
+                <a:ea typeface="+mn-ea"/>
+                <a:cs typeface="+mn-cs"/>
+              </a:defRPr>
+            </a:lvl1pPr>
+            <a:lvl2pPr marL="685800" indent="-228600" algn="l" defTabSz="914400" rtl="0" eaLnBrk="1" latinLnBrk="0" hangingPunct="1">
+              <a:lnSpc>
+                <a:spcPct val="120000"/>
+              </a:lnSpc>
+              <a:spcBef>
+                <a:spcPts val="500"/>
+              </a:spcBef>
+              <a:buClr>
+                <a:schemeClr val="accent1"/>
+              </a:buClr>
+              <a:buSzPct val="100000"/>
+              <a:buFont typeface="Arial" panose="020B0604020202020204" pitchFamily="34" charset="0"/>
+              <a:buChar char="•"/>
+              <a:defRPr sz="1800" kern="1200" cap="none" baseline="0">
+                <a:solidFill>
+                  <a:schemeClr val="tx1"/>
+                </a:solidFill>
+                <a:effectLst/>
+                <a:latin typeface="+mn-lt"/>
+                <a:ea typeface="+mn-ea"/>
+                <a:cs typeface="+mn-cs"/>
+              </a:defRPr>
+            </a:lvl2pPr>
+            <a:lvl3pPr marL="1143000" indent="-228600" algn="l" defTabSz="914400" rtl="0" eaLnBrk="1" latinLnBrk="0" hangingPunct="1">
+              <a:lnSpc>
+                <a:spcPct val="120000"/>
+              </a:lnSpc>
+              <a:spcBef>
+                <a:spcPts val="500"/>
+              </a:spcBef>
+              <a:buClr>
+                <a:schemeClr val="accent1"/>
+              </a:buClr>
+              <a:buSzPct val="100000"/>
+              <a:buFont typeface="Arial" panose="020B0604020202020204" pitchFamily="34" charset="0"/>
+              <a:buChar char="•"/>
+              <a:defRPr sz="1600" kern="1200">
+                <a:solidFill>
+                  <a:schemeClr val="tx1"/>
+                </a:solidFill>
+                <a:effectLst/>
+                <a:latin typeface="+mn-lt"/>
+                <a:ea typeface="+mn-ea"/>
+                <a:cs typeface="+mn-cs"/>
+              </a:defRPr>
+            </a:lvl3pPr>
+            <a:lvl4pPr marL="1600200" indent="-228600" algn="l" defTabSz="914400" rtl="0" eaLnBrk="1" latinLnBrk="0" hangingPunct="1">
+              <a:lnSpc>
+                <a:spcPct val="120000"/>
+              </a:lnSpc>
+              <a:spcBef>
+                <a:spcPts val="500"/>
+              </a:spcBef>
+              <a:buClr>
+                <a:schemeClr val="accent1"/>
+              </a:buClr>
+              <a:buSzPct val="100000"/>
+              <a:buFont typeface="Arial" panose="020B0604020202020204" pitchFamily="34" charset="0"/>
+              <a:buChar char="•"/>
+              <a:defRPr sz="1400" kern="1200" cap="none" baseline="0">
+                <a:solidFill>
+                  <a:schemeClr val="tx1"/>
+                </a:solidFill>
+                <a:effectLst/>
+                <a:latin typeface="+mn-lt"/>
+                <a:ea typeface="+mn-ea"/>
+                <a:cs typeface="+mn-cs"/>
+              </a:defRPr>
+            </a:lvl4pPr>
+            <a:lvl5pPr marL="2057400" indent="-228600" algn="l" defTabSz="914400" rtl="0" eaLnBrk="1" latinLnBrk="0" hangingPunct="1">
+              <a:lnSpc>
+                <a:spcPct val="120000"/>
+              </a:lnSpc>
+              <a:spcBef>
+                <a:spcPts val="500"/>
+              </a:spcBef>
+              <a:buClr>
+                <a:schemeClr val="accent1"/>
+              </a:buClr>
+              <a:buSzPct val="100000"/>
+              <a:buFont typeface="Arial" panose="020B0604020202020204" pitchFamily="34" charset="0"/>
+              <a:buChar char="•"/>
+              <a:defRPr sz="1200" kern="1200">
+                <a:solidFill>
+                  <a:schemeClr val="tx1"/>
+                </a:solidFill>
+                <a:effectLst/>
+                <a:latin typeface="+mn-lt"/>
+                <a:ea typeface="+mn-ea"/>
+                <a:cs typeface="+mn-cs"/>
+              </a:defRPr>
+            </a:lvl5pPr>
+            <a:lvl6pPr marL="2514600" indent="-228600" algn="l" defTabSz="914400" rtl="0" eaLnBrk="1" latinLnBrk="0" hangingPunct="1">
+              <a:lnSpc>
+                <a:spcPct val="120000"/>
+              </a:lnSpc>
+              <a:spcBef>
+                <a:spcPts val="500"/>
+              </a:spcBef>
+              <a:buClr>
+                <a:schemeClr val="accent1"/>
+              </a:buClr>
+              <a:buSzPct val="100000"/>
+              <a:buFont typeface="Arial" panose="020B0604020202020204" pitchFamily="34" charset="0"/>
+              <a:buChar char="•"/>
+              <a:defRPr sz="1200" kern="1200">
+                <a:solidFill>
+                  <a:schemeClr val="tx1"/>
+                </a:solidFill>
+                <a:effectLst/>
+                <a:latin typeface="+mn-lt"/>
+                <a:ea typeface="+mn-ea"/>
+                <a:cs typeface="+mn-cs"/>
+              </a:defRPr>
+            </a:lvl6pPr>
+            <a:lvl7pPr marL="2971800" indent="-228600" algn="l" defTabSz="914400" rtl="0" eaLnBrk="1" latinLnBrk="0" hangingPunct="1">
+              <a:lnSpc>
+                <a:spcPct val="120000"/>
+              </a:lnSpc>
+              <a:spcBef>
+                <a:spcPts val="500"/>
+              </a:spcBef>
+              <a:buClr>
+                <a:schemeClr val="accent1"/>
+              </a:buClr>
+              <a:buSzPct val="100000"/>
+              <a:buFont typeface="Arial" panose="020B0604020202020204" pitchFamily="34" charset="0"/>
+              <a:buChar char="•"/>
+              <a:defRPr sz="1200" kern="1200">
+                <a:solidFill>
+                  <a:schemeClr val="tx1"/>
+                </a:solidFill>
+                <a:effectLst/>
+                <a:latin typeface="+mn-lt"/>
+                <a:ea typeface="+mn-ea"/>
+                <a:cs typeface="+mn-cs"/>
+              </a:defRPr>
+            </a:lvl7pPr>
+            <a:lvl8pPr marL="3429000" indent="-228600" algn="l" defTabSz="914400" rtl="0" eaLnBrk="1" latinLnBrk="0" hangingPunct="1">
+              <a:lnSpc>
+                <a:spcPct val="120000"/>
+              </a:lnSpc>
+              <a:spcBef>
+                <a:spcPts val="500"/>
+              </a:spcBef>
+              <a:buClr>
+                <a:schemeClr val="accent1"/>
+              </a:buClr>
+              <a:buSzPct val="100000"/>
+              <a:buFont typeface="Arial" panose="020B0604020202020204" pitchFamily="34" charset="0"/>
+              <a:buChar char="•"/>
+              <a:defRPr sz="1200" kern="1200" baseline="0">
+                <a:solidFill>
+                  <a:schemeClr val="tx1"/>
+                </a:solidFill>
+                <a:effectLst/>
+                <a:latin typeface="+mn-lt"/>
+                <a:ea typeface="+mn-ea"/>
+                <a:cs typeface="+mn-cs"/>
+              </a:defRPr>
+            </a:lvl8pPr>
+            <a:lvl9pPr marL="3886200" indent="-228600" algn="l" defTabSz="914400" rtl="0" eaLnBrk="1" latinLnBrk="0" hangingPunct="1">
+              <a:lnSpc>
+                <a:spcPct val="120000"/>
+              </a:lnSpc>
+              <a:spcBef>
+                <a:spcPts val="500"/>
+              </a:spcBef>
+              <a:buClr>
+                <a:schemeClr val="accent1"/>
+              </a:buClr>
+              <a:buSzPct val="100000"/>
+              <a:buFont typeface="Arial" panose="020B0604020202020204" pitchFamily="34" charset="0"/>
+              <a:buChar char="•"/>
+              <a:defRPr sz="1200" kern="1200" baseline="0">
+                <a:solidFill>
+                  <a:schemeClr val="tx1"/>
+                </a:solidFill>
+                <a:effectLst/>
+                <a:latin typeface="+mn-lt"/>
+                <a:ea typeface="+mn-ea"/>
+                <a:cs typeface="+mn-cs"/>
+              </a:defRPr>
+            </a:lvl9pPr>
+          </a:lstStyle>
+          <a:p>
+            <a:r>
+              <a:rPr lang="de-DE" sz="1300" dirty="0"/>
+              <a:t>Nicht dargestellt ist das Protokoll in der Netzwerkschicht</a:t>
+            </a:r>
+          </a:p>
+          <a:p>
+            <a:r>
+              <a:rPr lang="de-DE" sz="1300" dirty="0"/>
+              <a:t>Nicht dargestellt ist die „</a:t>
+            </a:r>
+            <a:r>
+              <a:rPr lang="de-DE" sz="1300" dirty="0" err="1"/>
+              <a:t>Lifo</a:t>
+            </a:r>
+            <a:r>
+              <a:rPr lang="de-DE" sz="1300" dirty="0"/>
+              <a:t>-Queue“ in der Netzwerkschicht des Hosts</a:t>
+            </a:r>
+          </a:p>
+          <a:p>
+            <a:r>
+              <a:rPr lang="de-DE" sz="1300" dirty="0"/>
+              <a:t>Erläuterung der Grafik auf der nächsten Folie</a:t>
+            </a:r>
+          </a:p>
+        </p:txBody>
+      </p:sp>
+      <p:cxnSp>
+        <p:nvCxnSpPr>
+          <p:cNvPr id="53" name="Gerade Verbindung mit Pfeil 52"/>
+          <p:cNvCxnSpPr>
+            <a:stCxn id="28" idx="3"/>
+            <a:endCxn id="30" idx="1"/>
+          </p:cNvCxnSpPr>
+          <p:nvPr/>
+        </p:nvCxnSpPr>
+        <p:spPr>
+          <a:xfrm>
+            <a:off x="2233492" y="4001938"/>
+            <a:ext cx="440963" cy="0"/>
+          </a:xfrm>
+          <a:prstGeom prst="straightConnector1">
+            <a:avLst/>
+          </a:prstGeom>
+          <a:ln w="44450">
+            <a:tailEnd type="triangle"/>
+          </a:ln>
+        </p:spPr>
+        <p:style>
+          <a:lnRef idx="1">
+            <a:schemeClr val="dk1"/>
+          </a:lnRef>
+          <a:fillRef idx="0">
+            <a:schemeClr val="dk1"/>
+          </a:fillRef>
+          <a:effectRef idx="0">
+            <a:schemeClr val="dk1"/>
+          </a:effectRef>
+          <a:fontRef idx="minor">
+            <a:schemeClr val="tx1"/>
+          </a:fontRef>
+        </p:style>
+      </p:cxnSp>
+      <p:sp>
+        <p:nvSpPr>
+          <p:cNvPr id="66" name="Ellipse 65"/>
+          <p:cNvSpPr/>
+          <p:nvPr/>
+        </p:nvSpPr>
+        <p:spPr>
+          <a:xfrm>
+            <a:off x="1947806" y="3382323"/>
+            <a:ext cx="256209" cy="256209"/>
+          </a:xfrm>
+          <a:prstGeom prst="ellipse">
+            <a:avLst/>
+          </a:prstGeom>
+          <a:ln>
+            <a:solidFill>
+              <a:schemeClr val="bg1"/>
+            </a:solidFill>
+          </a:ln>
+        </p:spPr>
+        <p:style>
+          <a:lnRef idx="2">
+            <a:schemeClr val="accent1">
+              <a:shade val="50000"/>
+            </a:schemeClr>
+          </a:lnRef>
+          <a:fillRef idx="1">
+            <a:schemeClr val="accent1"/>
+          </a:fillRef>
+          <a:effectRef idx="0">
+            <a:schemeClr val="accent1"/>
+          </a:effectRef>
+          <a:fontRef idx="minor">
+            <a:schemeClr val="lt1"/>
+          </a:fontRef>
+        </p:style>
+        <p:txBody>
+          <a:bodyPr lIns="0" tIns="0" rIns="0" bIns="0" rtlCol="0" anchor="ctr">
+            <a:normAutofit fontScale="77500" lnSpcReduction="20000"/>
+          </a:bodyPr>
+          <a:lstStyle/>
+          <a:p>
+            <a:pPr algn="ctr"/>
+            <a:r>
+              <a:rPr lang="de-DE" dirty="0"/>
+              <a:t>1</a:t>
+            </a:r>
+          </a:p>
+        </p:txBody>
+      </p:sp>
+      <p:sp>
+        <p:nvSpPr>
+          <p:cNvPr id="82" name="Ellipse 81"/>
+          <p:cNvSpPr/>
+          <p:nvPr/>
+        </p:nvSpPr>
+        <p:spPr>
+          <a:xfrm>
+            <a:off x="2271495" y="4004008"/>
+            <a:ext cx="256209" cy="256209"/>
+          </a:xfrm>
+          <a:prstGeom prst="ellipse">
+            <a:avLst/>
+          </a:prstGeom>
+          <a:ln>
+            <a:solidFill>
+              <a:schemeClr val="bg1"/>
+            </a:solidFill>
+          </a:ln>
+        </p:spPr>
+        <p:style>
+          <a:lnRef idx="2">
+            <a:schemeClr val="accent1">
+              <a:shade val="50000"/>
+            </a:schemeClr>
+          </a:lnRef>
+          <a:fillRef idx="1">
+            <a:schemeClr val="accent1"/>
+          </a:fillRef>
+          <a:effectRef idx="0">
+            <a:schemeClr val="accent1"/>
+          </a:effectRef>
+          <a:fontRef idx="minor">
+            <a:schemeClr val="lt1"/>
+          </a:fontRef>
+        </p:style>
+        <p:txBody>
+          <a:bodyPr lIns="0" tIns="0" rIns="0" bIns="0" rtlCol="0" anchor="ctr">
+            <a:normAutofit fontScale="77500" lnSpcReduction="20000"/>
+          </a:bodyPr>
+          <a:lstStyle/>
+          <a:p>
+            <a:pPr algn="ctr"/>
+            <a:r>
+              <a:rPr lang="de-DE" dirty="0"/>
+              <a:t>2</a:t>
+            </a:r>
+          </a:p>
+        </p:txBody>
+      </p:sp>
+      <p:cxnSp>
+        <p:nvCxnSpPr>
+          <p:cNvPr id="85" name="Gerade Verbindung mit Pfeil 84"/>
+          <p:cNvCxnSpPr/>
+          <p:nvPr/>
+        </p:nvCxnSpPr>
+        <p:spPr>
+          <a:xfrm flipH="1">
+            <a:off x="2271495" y="3895246"/>
+            <a:ext cx="369102" cy="1497"/>
+          </a:xfrm>
+          <a:prstGeom prst="straightConnector1">
+            <a:avLst/>
+          </a:prstGeom>
+          <a:ln w="44450">
+            <a:tailEnd type="triangle"/>
+          </a:ln>
+        </p:spPr>
+        <p:style>
+          <a:lnRef idx="1">
+            <a:schemeClr val="dk1"/>
+          </a:lnRef>
+          <a:fillRef idx="0">
+            <a:schemeClr val="dk1"/>
+          </a:fillRef>
+          <a:effectRef idx="0">
+            <a:schemeClr val="dk1"/>
+          </a:effectRef>
+          <a:fontRef idx="minor">
+            <a:schemeClr val="tx1"/>
+          </a:fontRef>
+        </p:style>
+      </p:cxnSp>
+      <p:sp>
+        <p:nvSpPr>
+          <p:cNvPr id="87" name="Ellipse 86"/>
+          <p:cNvSpPr/>
+          <p:nvPr/>
+        </p:nvSpPr>
+        <p:spPr>
+          <a:xfrm>
+            <a:off x="2490880" y="3638532"/>
+            <a:ext cx="256209" cy="256209"/>
+          </a:xfrm>
+          <a:prstGeom prst="ellipse">
+            <a:avLst/>
+          </a:prstGeom>
+          <a:ln>
+            <a:solidFill>
+              <a:schemeClr val="bg1"/>
+            </a:solidFill>
+          </a:ln>
+        </p:spPr>
+        <p:style>
+          <a:lnRef idx="2">
+            <a:schemeClr val="accent1">
+              <a:shade val="50000"/>
+            </a:schemeClr>
+          </a:lnRef>
+          <a:fillRef idx="1">
+            <a:schemeClr val="accent1"/>
+          </a:fillRef>
+          <a:effectRef idx="0">
+            <a:schemeClr val="accent1"/>
+          </a:effectRef>
+          <a:fontRef idx="minor">
+            <a:schemeClr val="lt1"/>
+          </a:fontRef>
+        </p:style>
+        <p:txBody>
+          <a:bodyPr lIns="0" tIns="0" rIns="0" bIns="0" rtlCol="0" anchor="ctr">
+            <a:normAutofit fontScale="77500" lnSpcReduction="20000"/>
+          </a:bodyPr>
+          <a:lstStyle/>
+          <a:p>
+            <a:pPr algn="ctr"/>
+            <a:r>
+              <a:rPr lang="de-DE" dirty="0"/>
+              <a:t>3</a:t>
+            </a:r>
+          </a:p>
+        </p:txBody>
+      </p:sp>
+      <p:sp>
+        <p:nvSpPr>
+          <p:cNvPr id="89" name="Ellipse 88"/>
+          <p:cNvSpPr/>
+          <p:nvPr/>
+        </p:nvSpPr>
+        <p:spPr>
+          <a:xfrm>
+            <a:off x="2497839" y="4431078"/>
+            <a:ext cx="256209" cy="256209"/>
+          </a:xfrm>
+          <a:prstGeom prst="ellipse">
+            <a:avLst/>
+          </a:prstGeom>
+          <a:ln>
+            <a:solidFill>
+              <a:schemeClr val="bg1"/>
+            </a:solidFill>
+          </a:ln>
+        </p:spPr>
+        <p:style>
+          <a:lnRef idx="2">
+            <a:schemeClr val="accent1">
+              <a:shade val="50000"/>
+            </a:schemeClr>
+          </a:lnRef>
+          <a:fillRef idx="1">
+            <a:schemeClr val="accent1"/>
+          </a:fillRef>
+          <a:effectRef idx="0">
+            <a:schemeClr val="accent1"/>
+          </a:effectRef>
+          <a:fontRef idx="minor">
+            <a:schemeClr val="lt1"/>
+          </a:fontRef>
+        </p:style>
+        <p:txBody>
+          <a:bodyPr lIns="0" tIns="0" rIns="0" bIns="0" rtlCol="0" anchor="ctr">
+            <a:normAutofit fontScale="77500" lnSpcReduction="20000"/>
+          </a:bodyPr>
+          <a:lstStyle/>
+          <a:p>
+            <a:pPr algn="ctr"/>
+            <a:r>
+              <a:rPr lang="de-DE" dirty="0"/>
+              <a:t>3</a:t>
+            </a:r>
+          </a:p>
+        </p:txBody>
+      </p:sp>
+      <p:sp>
+        <p:nvSpPr>
+          <p:cNvPr id="90" name="Ellipse 89"/>
+          <p:cNvSpPr/>
+          <p:nvPr/>
+        </p:nvSpPr>
+        <p:spPr>
+          <a:xfrm>
+            <a:off x="5332178" y="4286613"/>
+            <a:ext cx="256209" cy="256209"/>
+          </a:xfrm>
+          <a:prstGeom prst="ellipse">
+            <a:avLst/>
+          </a:prstGeom>
+          <a:ln>
+            <a:solidFill>
+              <a:schemeClr val="bg1"/>
+            </a:solidFill>
+          </a:ln>
+        </p:spPr>
+        <p:style>
+          <a:lnRef idx="2">
+            <a:schemeClr val="accent1">
+              <a:shade val="50000"/>
+            </a:schemeClr>
+          </a:lnRef>
+          <a:fillRef idx="1">
+            <a:schemeClr val="accent1"/>
+          </a:fillRef>
+          <a:effectRef idx="0">
+            <a:schemeClr val="accent1"/>
+          </a:effectRef>
+          <a:fontRef idx="minor">
+            <a:schemeClr val="lt1"/>
+          </a:fontRef>
+        </p:style>
+        <p:txBody>
+          <a:bodyPr lIns="0" tIns="0" rIns="0" bIns="0" rtlCol="0" anchor="ctr">
+            <a:normAutofit fontScale="77500" lnSpcReduction="20000"/>
+          </a:bodyPr>
+          <a:lstStyle/>
+          <a:p>
+            <a:pPr algn="ctr"/>
+            <a:r>
+              <a:rPr lang="de-DE" dirty="0"/>
+              <a:t>3</a:t>
+            </a:r>
+          </a:p>
+        </p:txBody>
+      </p:sp>
+      <p:sp>
+        <p:nvSpPr>
+          <p:cNvPr id="92" name="Ellipse 91"/>
+          <p:cNvSpPr/>
+          <p:nvPr/>
+        </p:nvSpPr>
+        <p:spPr>
+          <a:xfrm>
+            <a:off x="9177731" y="4307417"/>
+            <a:ext cx="256209" cy="256209"/>
+          </a:xfrm>
+          <a:prstGeom prst="ellipse">
+            <a:avLst/>
+          </a:prstGeom>
+          <a:ln>
+            <a:solidFill>
+              <a:schemeClr val="bg1"/>
+            </a:solidFill>
+          </a:ln>
+        </p:spPr>
+        <p:style>
+          <a:lnRef idx="2">
+            <a:schemeClr val="accent1">
+              <a:shade val="50000"/>
+            </a:schemeClr>
+          </a:lnRef>
+          <a:fillRef idx="1">
+            <a:schemeClr val="accent1"/>
+          </a:fillRef>
+          <a:effectRef idx="0">
+            <a:schemeClr val="accent1"/>
+          </a:effectRef>
+          <a:fontRef idx="minor">
+            <a:schemeClr val="lt1"/>
+          </a:fontRef>
+        </p:style>
+        <p:txBody>
+          <a:bodyPr lIns="0" tIns="0" rIns="0" bIns="0" rtlCol="0" anchor="ctr">
+            <a:normAutofit fontScale="77500" lnSpcReduction="20000"/>
+          </a:bodyPr>
+          <a:lstStyle/>
+          <a:p>
+            <a:pPr algn="ctr"/>
+            <a:r>
+              <a:rPr lang="de-DE" dirty="0"/>
+              <a:t>3</a:t>
+            </a:r>
+          </a:p>
+        </p:txBody>
+      </p:sp>
+      <p:sp>
+        <p:nvSpPr>
+          <p:cNvPr id="93" name="Ellipse 92"/>
+          <p:cNvSpPr/>
+          <p:nvPr/>
+        </p:nvSpPr>
+        <p:spPr>
+          <a:xfrm>
+            <a:off x="5327426" y="3550068"/>
+            <a:ext cx="256209" cy="256209"/>
+          </a:xfrm>
+          <a:prstGeom prst="ellipse">
+            <a:avLst/>
+          </a:prstGeom>
+          <a:ln>
+            <a:solidFill>
+              <a:schemeClr val="bg1"/>
+            </a:solidFill>
+          </a:ln>
+        </p:spPr>
+        <p:style>
+          <a:lnRef idx="2">
+            <a:schemeClr val="accent1">
+              <a:shade val="50000"/>
+            </a:schemeClr>
+          </a:lnRef>
+          <a:fillRef idx="1">
+            <a:schemeClr val="accent1"/>
+          </a:fillRef>
+          <a:effectRef idx="0">
+            <a:schemeClr val="accent1"/>
+          </a:effectRef>
+          <a:fontRef idx="minor">
+            <a:schemeClr val="lt1"/>
+          </a:fontRef>
+        </p:style>
+        <p:txBody>
+          <a:bodyPr lIns="0" tIns="0" rIns="0" bIns="0" rtlCol="0" anchor="ctr">
+            <a:normAutofit fontScale="77500" lnSpcReduction="20000"/>
+          </a:bodyPr>
+          <a:lstStyle/>
+          <a:p>
+            <a:pPr algn="ctr"/>
+            <a:r>
+              <a:rPr lang="de-DE" dirty="0"/>
+              <a:t>4</a:t>
+            </a:r>
+          </a:p>
+        </p:txBody>
+      </p:sp>
+      <p:sp>
+        <p:nvSpPr>
+          <p:cNvPr id="95" name="Ellipse 94"/>
+          <p:cNvSpPr/>
+          <p:nvPr/>
+        </p:nvSpPr>
+        <p:spPr>
+          <a:xfrm>
+            <a:off x="9173420" y="3556997"/>
+            <a:ext cx="256209" cy="256209"/>
+          </a:xfrm>
+          <a:prstGeom prst="ellipse">
+            <a:avLst/>
+          </a:prstGeom>
+          <a:ln>
+            <a:solidFill>
+              <a:schemeClr val="bg1"/>
+            </a:solidFill>
+          </a:ln>
+        </p:spPr>
+        <p:style>
+          <a:lnRef idx="2">
+            <a:schemeClr val="accent1">
+              <a:shade val="50000"/>
+            </a:schemeClr>
+          </a:lnRef>
+          <a:fillRef idx="1">
+            <a:schemeClr val="accent1"/>
+          </a:fillRef>
+          <a:effectRef idx="0">
+            <a:schemeClr val="accent1"/>
+          </a:effectRef>
+          <a:fontRef idx="minor">
+            <a:schemeClr val="lt1"/>
+          </a:fontRef>
+        </p:style>
+        <p:txBody>
+          <a:bodyPr lIns="0" tIns="0" rIns="0" bIns="0" rtlCol="0" anchor="ctr">
+            <a:normAutofit fontScale="77500" lnSpcReduction="20000"/>
+          </a:bodyPr>
+          <a:lstStyle/>
+          <a:p>
+            <a:pPr algn="ctr"/>
+            <a:r>
+              <a:rPr lang="de-DE" dirty="0"/>
+              <a:t>4</a:t>
+            </a:r>
+          </a:p>
+        </p:txBody>
+      </p:sp>
+      <p:sp>
+        <p:nvSpPr>
+          <p:cNvPr id="96" name="Ellipse 95"/>
+          <p:cNvSpPr/>
+          <p:nvPr/>
+        </p:nvSpPr>
+        <p:spPr>
+          <a:xfrm>
+            <a:off x="5294068" y="2805159"/>
+            <a:ext cx="256209" cy="256209"/>
+          </a:xfrm>
+          <a:prstGeom prst="ellipse">
+            <a:avLst/>
+          </a:prstGeom>
+          <a:ln>
+            <a:solidFill>
+              <a:schemeClr val="bg1"/>
+            </a:solidFill>
+          </a:ln>
+        </p:spPr>
+        <p:style>
+          <a:lnRef idx="2">
+            <a:schemeClr val="accent1">
+              <a:shade val="50000"/>
+            </a:schemeClr>
+          </a:lnRef>
+          <a:fillRef idx="1">
+            <a:schemeClr val="accent1"/>
+          </a:fillRef>
+          <a:effectRef idx="0">
+            <a:schemeClr val="accent1"/>
+          </a:effectRef>
+          <a:fontRef idx="minor">
+            <a:schemeClr val="lt1"/>
+          </a:fontRef>
+        </p:style>
+        <p:txBody>
+          <a:bodyPr lIns="0" tIns="0" rIns="0" bIns="0" rtlCol="0" anchor="ctr">
+            <a:normAutofit fontScale="77500" lnSpcReduction="20000"/>
+          </a:bodyPr>
+          <a:lstStyle/>
+          <a:p>
+            <a:pPr algn="ctr"/>
+            <a:r>
+              <a:rPr lang="de-DE" dirty="0"/>
+              <a:t>5</a:t>
+            </a:r>
+          </a:p>
+        </p:txBody>
+      </p:sp>
+      <p:sp>
+        <p:nvSpPr>
+          <p:cNvPr id="97" name="Ellipse 96"/>
+          <p:cNvSpPr/>
+          <p:nvPr/>
+        </p:nvSpPr>
+        <p:spPr>
+          <a:xfrm>
+            <a:off x="9136069" y="2805159"/>
+            <a:ext cx="256209" cy="256209"/>
+          </a:xfrm>
+          <a:prstGeom prst="ellipse">
+            <a:avLst/>
+          </a:prstGeom>
+          <a:ln>
+            <a:solidFill>
+              <a:schemeClr val="bg1"/>
+            </a:solidFill>
+          </a:ln>
+        </p:spPr>
+        <p:style>
+          <a:lnRef idx="2">
+            <a:schemeClr val="accent1">
+              <a:shade val="50000"/>
+            </a:schemeClr>
+          </a:lnRef>
+          <a:fillRef idx="1">
+            <a:schemeClr val="accent1"/>
+          </a:fillRef>
+          <a:effectRef idx="0">
+            <a:schemeClr val="accent1"/>
+          </a:effectRef>
+          <a:fontRef idx="minor">
+            <a:schemeClr val="lt1"/>
+          </a:fontRef>
+        </p:style>
+        <p:txBody>
+          <a:bodyPr lIns="0" tIns="0" rIns="0" bIns="0" rtlCol="0" anchor="ctr">
+            <a:normAutofit fontScale="77500" lnSpcReduction="20000"/>
+          </a:bodyPr>
+          <a:lstStyle/>
+          <a:p>
+            <a:pPr algn="ctr"/>
+            <a:r>
+              <a:rPr lang="de-DE" dirty="0"/>
+              <a:t>5</a:t>
+            </a:r>
+          </a:p>
+        </p:txBody>
+      </p:sp>
+    </p:spTree>
+    <p:extLst>
+      <p:ext uri="{BB962C8B-B14F-4D97-AF65-F5344CB8AC3E}">
+        <p14:creationId xmlns:p14="http://schemas.microsoft.com/office/powerpoint/2010/main" val="107331076"/>
+      </p:ext>
+    </p:extLst>
+  </p:cSld>
+  <p:clrMapOvr>
+    <a:masterClrMapping/>
+  </p:clrMapOvr>
+</p:sld>
+</file>
+
+<file path=ppt/slides/slide5.xml><?xml version="1.0" encoding="utf-8"?>
+<p:sld xmlns:a="http://schemas.openxmlformats.org/drawingml/2006/main" xmlns:r="http://schemas.openxmlformats.org/officeDocument/2006/relationships" xmlns:p="http://schemas.openxmlformats.org/presentationml/2006/main">
+  <p:cSld>
+    <p:spTree>
+      <p:nvGrpSpPr>
+        <p:cNvPr id="1" name=""/>
+        <p:cNvGrpSpPr/>
+        <p:nvPr/>
+      </p:nvGrpSpPr>
+      <p:grpSpPr>
+        <a:xfrm>
+          <a:off x="0" y="0"/>
+          <a:ext cx="0" cy="0"/>
+          <a:chOff x="0" y="0"/>
+          <a:chExt cx="0" cy="0"/>
+        </a:xfrm>
+      </p:grpSpPr>
+      <p:sp>
+        <p:nvSpPr>
+          <p:cNvPr id="2" name="Titel 1"/>
+          <p:cNvSpPr>
+            <a:spLocks noGrp="1"/>
+          </p:cNvSpPr>
+          <p:nvPr>
+            <p:ph type="title"/>
+          </p:nvPr>
+        </p:nvSpPr>
+        <p:spPr/>
+        <p:txBody>
+          <a:bodyPr/>
+          <a:lstStyle/>
+          <a:p>
+            <a:r>
+              <a:rPr lang="de-DE" dirty="0"/>
+              <a:t>Kommunikation der Belegung von Feldern während des </a:t>
+            </a:r>
+            <a:r>
+              <a:rPr lang="de-DE" dirty="0" err="1"/>
+              <a:t>spiels</a:t>
+            </a:r>
+            <a:endParaRPr lang="de-DE" dirty="0"/>
+          </a:p>
+        </p:txBody>
+      </p:sp>
+      <p:sp>
+        <p:nvSpPr>
+          <p:cNvPr id="3" name="Inhaltsplatzhalter 2"/>
+          <p:cNvSpPr>
+            <a:spLocks noGrp="1"/>
+          </p:cNvSpPr>
+          <p:nvPr>
+            <p:ph idx="1"/>
+          </p:nvPr>
+        </p:nvSpPr>
+        <p:spPr>
+          <a:xfrm>
+            <a:off x="1451579" y="2015732"/>
+            <a:ext cx="10092721" cy="3908818"/>
+          </a:xfrm>
+        </p:spPr>
+        <p:txBody>
+          <a:bodyPr>
+            <a:normAutofit fontScale="85000" lnSpcReduction="10000"/>
+          </a:bodyPr>
+          <a:lstStyle/>
+          <a:p>
+            <a:r>
+              <a:rPr lang="de-DE" dirty="0"/>
+              <a:t>Beim Belegen eines Feldes durch einen Klick im GUI entsteht durch die Anwendungsschicht angestoßen in der Netzwerkschicht eine Nachricht.</a:t>
+            </a:r>
+          </a:p>
+          <a:p>
+            <a:r>
+              <a:rPr lang="de-DE" dirty="0"/>
+              <a:t>Diese Nachricht enthält die Informationen:</a:t>
+            </a:r>
+          </a:p>
+          <a:p>
+            <a:pPr lvl="1"/>
+            <a:r>
+              <a:rPr lang="de-DE" dirty="0"/>
+              <a:t>Welcher Spieler hat geklickt?</a:t>
+            </a:r>
+          </a:p>
+          <a:p>
+            <a:pPr lvl="1"/>
+            <a:r>
+              <a:rPr lang="de-DE" dirty="0"/>
+              <a:t>Welches Feld hat er geklickt?</a:t>
+            </a:r>
+          </a:p>
+          <a:p>
+            <a:r>
+              <a:rPr lang="de-DE" dirty="0"/>
+              <a:t>Die Nachricht wird von der Anwendungsschicht an den Client übermittelt.</a:t>
+            </a:r>
+          </a:p>
+          <a:p>
+            <a:r>
+              <a:rPr lang="de-DE" dirty="0"/>
+              <a:t>Der Client sendet die Nachricht an den Server.</a:t>
+            </a:r>
+          </a:p>
+          <a:p>
+            <a:r>
+              <a:rPr lang="de-DE" dirty="0"/>
+              <a:t>Der Server sendet die Nachricht an alle Clients.</a:t>
+            </a:r>
+          </a:p>
+          <a:p>
+            <a:r>
+              <a:rPr lang="de-DE" dirty="0"/>
+              <a:t>Die Anwendungsschicht beobachtet jeweils „ihren“ Client und ändert sich, wenn eine Nachricht ankommt. </a:t>
+            </a:r>
+          </a:p>
+          <a:p>
+            <a:r>
+              <a:rPr lang="de-DE" dirty="0"/>
+              <a:t>Das GUI beobachtet die Anwendungsschicht und ändert sich entsprechend.</a:t>
+            </a:r>
+          </a:p>
+          <a:p>
+            <a:endParaRPr lang="de-DE" dirty="0"/>
+          </a:p>
+        </p:txBody>
+      </p:sp>
+      <p:sp>
+        <p:nvSpPr>
+          <p:cNvPr id="8" name="Ellipse 7"/>
+          <p:cNvSpPr/>
+          <p:nvPr/>
+        </p:nvSpPr>
+        <p:spPr>
+          <a:xfrm>
+            <a:off x="1180350" y="3842036"/>
+            <a:ext cx="256209" cy="256209"/>
+          </a:xfrm>
+          <a:prstGeom prst="ellipse">
+            <a:avLst/>
+          </a:prstGeom>
+        </p:spPr>
+        <p:style>
+          <a:lnRef idx="2">
+            <a:schemeClr val="accent1">
+              <a:shade val="50000"/>
+            </a:schemeClr>
+          </a:lnRef>
+          <a:fillRef idx="1">
+            <a:schemeClr val="accent1"/>
+          </a:fillRef>
+          <a:effectRef idx="0">
+            <a:schemeClr val="accent1"/>
+          </a:effectRef>
+          <a:fontRef idx="minor">
+            <a:schemeClr val="lt1"/>
+          </a:fontRef>
+        </p:style>
+        <p:txBody>
+          <a:bodyPr lIns="0" tIns="0" rIns="0" bIns="0" rtlCol="0" anchor="ctr">
+            <a:normAutofit fontScale="77500" lnSpcReduction="20000"/>
+          </a:bodyPr>
+          <a:lstStyle/>
+          <a:p>
+            <a:pPr algn="ctr"/>
+            <a:r>
+              <a:rPr lang="de-DE" dirty="0"/>
+              <a:t>1</a:t>
+            </a:r>
+          </a:p>
+        </p:txBody>
+      </p:sp>
+      <p:sp>
+        <p:nvSpPr>
+          <p:cNvPr id="9" name="Ellipse 8"/>
+          <p:cNvSpPr/>
+          <p:nvPr/>
+        </p:nvSpPr>
+        <p:spPr>
+          <a:xfrm>
+            <a:off x="1195370" y="4260223"/>
+            <a:ext cx="256209" cy="256209"/>
+          </a:xfrm>
+          <a:prstGeom prst="ellipse">
+            <a:avLst/>
+          </a:prstGeom>
+        </p:spPr>
+        <p:style>
+          <a:lnRef idx="2">
+            <a:schemeClr val="accent1">
+              <a:shade val="50000"/>
+            </a:schemeClr>
+          </a:lnRef>
+          <a:fillRef idx="1">
+            <a:schemeClr val="accent1"/>
+          </a:fillRef>
+          <a:effectRef idx="0">
+            <a:schemeClr val="accent1"/>
+          </a:effectRef>
+          <a:fontRef idx="minor">
+            <a:schemeClr val="lt1"/>
+          </a:fontRef>
+        </p:style>
+        <p:txBody>
+          <a:bodyPr lIns="0" tIns="0" rIns="0" bIns="0" rtlCol="0" anchor="ctr">
+            <a:normAutofit fontScale="77500" lnSpcReduction="20000"/>
+          </a:bodyPr>
+          <a:lstStyle/>
+          <a:p>
+            <a:pPr algn="ctr"/>
+            <a:r>
+              <a:rPr lang="de-DE" dirty="0"/>
+              <a:t>2</a:t>
+            </a:r>
+          </a:p>
+        </p:txBody>
+      </p:sp>
+      <p:sp>
+        <p:nvSpPr>
+          <p:cNvPr id="10" name="Ellipse 9"/>
+          <p:cNvSpPr/>
+          <p:nvPr/>
+        </p:nvSpPr>
+        <p:spPr>
+          <a:xfrm>
+            <a:off x="1195370" y="4621468"/>
+            <a:ext cx="256209" cy="256209"/>
+          </a:xfrm>
+          <a:prstGeom prst="ellipse">
+            <a:avLst/>
+          </a:prstGeom>
+        </p:spPr>
+        <p:style>
+          <a:lnRef idx="2">
+            <a:schemeClr val="accent1">
+              <a:shade val="50000"/>
+            </a:schemeClr>
+          </a:lnRef>
+          <a:fillRef idx="1">
+            <a:schemeClr val="accent1"/>
+          </a:fillRef>
+          <a:effectRef idx="0">
+            <a:schemeClr val="accent1"/>
+          </a:effectRef>
+          <a:fontRef idx="minor">
+            <a:schemeClr val="lt1"/>
+          </a:fontRef>
+        </p:style>
+        <p:txBody>
+          <a:bodyPr lIns="0" tIns="0" rIns="0" bIns="0" rtlCol="0" anchor="ctr">
+            <a:normAutofit fontScale="77500" lnSpcReduction="20000"/>
+          </a:bodyPr>
+          <a:lstStyle/>
+          <a:p>
+            <a:pPr algn="ctr"/>
+            <a:r>
+              <a:rPr lang="de-DE" dirty="0"/>
+              <a:t>3</a:t>
+            </a:r>
+          </a:p>
+        </p:txBody>
+      </p:sp>
+      <p:sp>
+        <p:nvSpPr>
+          <p:cNvPr id="11" name="Ellipse 10"/>
+          <p:cNvSpPr/>
+          <p:nvPr/>
+        </p:nvSpPr>
+        <p:spPr>
+          <a:xfrm>
+            <a:off x="1195370" y="5027868"/>
+            <a:ext cx="256209" cy="256209"/>
+          </a:xfrm>
+          <a:prstGeom prst="ellipse">
+            <a:avLst/>
+          </a:prstGeom>
+        </p:spPr>
+        <p:style>
+          <a:lnRef idx="2">
+            <a:schemeClr val="accent1">
+              <a:shade val="50000"/>
+            </a:schemeClr>
+          </a:lnRef>
+          <a:fillRef idx="1">
+            <a:schemeClr val="accent1"/>
+          </a:fillRef>
+          <a:effectRef idx="0">
+            <a:schemeClr val="accent1"/>
+          </a:effectRef>
+          <a:fontRef idx="minor">
+            <a:schemeClr val="lt1"/>
+          </a:fontRef>
+        </p:style>
+        <p:txBody>
+          <a:bodyPr lIns="0" tIns="0" rIns="0" bIns="0" rtlCol="0" anchor="ctr">
+            <a:normAutofit fontScale="77500" lnSpcReduction="20000"/>
+          </a:bodyPr>
+          <a:lstStyle/>
+          <a:p>
+            <a:pPr algn="ctr"/>
+            <a:r>
+              <a:rPr lang="de-DE" dirty="0"/>
+              <a:t>4</a:t>
+            </a:r>
+          </a:p>
+        </p:txBody>
+      </p:sp>
+      <p:sp>
+        <p:nvSpPr>
+          <p:cNvPr id="12" name="Ellipse 11"/>
+          <p:cNvSpPr/>
+          <p:nvPr/>
+        </p:nvSpPr>
+        <p:spPr>
+          <a:xfrm>
+            <a:off x="1195370" y="5456846"/>
+            <a:ext cx="256209" cy="256209"/>
+          </a:xfrm>
+          <a:prstGeom prst="ellipse">
+            <a:avLst/>
+          </a:prstGeom>
+        </p:spPr>
+        <p:style>
+          <a:lnRef idx="2">
+            <a:schemeClr val="accent1">
+              <a:shade val="50000"/>
+            </a:schemeClr>
+          </a:lnRef>
+          <a:fillRef idx="1">
+            <a:schemeClr val="accent1"/>
+          </a:fillRef>
+          <a:effectRef idx="0">
+            <a:schemeClr val="accent1"/>
+          </a:effectRef>
+          <a:fontRef idx="minor">
+            <a:schemeClr val="lt1"/>
+          </a:fontRef>
+        </p:style>
+        <p:txBody>
+          <a:bodyPr lIns="0" tIns="0" rIns="0" bIns="0" rtlCol="0" anchor="ctr">
+            <a:normAutofit fontScale="77500" lnSpcReduction="20000"/>
+          </a:bodyPr>
+          <a:lstStyle/>
+          <a:p>
+            <a:pPr algn="ctr"/>
+            <a:r>
+              <a:rPr lang="de-DE" dirty="0"/>
+              <a:t>5</a:t>
+            </a:r>
+          </a:p>
+        </p:txBody>
+      </p:sp>
+    </p:spTree>
+    <p:extLst>
+      <p:ext uri="{BB962C8B-B14F-4D97-AF65-F5344CB8AC3E}">
+        <p14:creationId xmlns:p14="http://schemas.microsoft.com/office/powerpoint/2010/main" val="568188884"/>
+      </p:ext>
+    </p:extLst>
+  </p:cSld>
+  <p:clrMapOvr>
+    <a:masterClrMapping/>
+  </p:clrMapOvr>
+</p:sld>
+</file>
+
+<file path=ppt/slides/slide6.xml><?xml version="1.0" encoding="utf-8"?>
+<p:sld xmlns:a="http://schemas.openxmlformats.org/drawingml/2006/main" xmlns:r="http://schemas.openxmlformats.org/officeDocument/2006/relationships" xmlns:p="http://schemas.openxmlformats.org/presentationml/2006/main">
+  <p:cSld>
+    <p:spTree>
+      <p:nvGrpSpPr>
+        <p:cNvPr id="1" name=""/>
+        <p:cNvGrpSpPr/>
+        <p:nvPr/>
+      </p:nvGrpSpPr>
+      <p:grpSpPr>
+        <a:xfrm>
+          <a:off x="0" y="0"/>
+          <a:ext cx="0" cy="0"/>
+          <a:chOff x="0" y="0"/>
+          <a:chExt cx="0" cy="0"/>
+        </a:xfrm>
+      </p:grpSpPr>
+      <p:sp>
+        <p:nvSpPr>
+          <p:cNvPr id="2" name="Titel 1"/>
+          <p:cNvSpPr>
+            <a:spLocks noGrp="1"/>
+          </p:cNvSpPr>
+          <p:nvPr>
+            <p:ph type="title"/>
+          </p:nvPr>
+        </p:nvSpPr>
+        <p:spPr/>
+        <p:txBody>
+          <a:bodyPr/>
+          <a:lstStyle/>
+          <a:p>
+            <a:r>
+              <a:rPr lang="de-DE" dirty="0"/>
+              <a:t>Alternativer Entwurf</a:t>
+            </a:r>
+          </a:p>
+        </p:txBody>
+      </p:sp>
+      <p:sp>
+        <p:nvSpPr>
+          <p:cNvPr id="3" name="Textplatzhalter 2"/>
+          <p:cNvSpPr>
+            <a:spLocks noGrp="1"/>
+          </p:cNvSpPr>
+          <p:nvPr>
+            <p:ph type="body" idx="1"/>
+          </p:nvPr>
+        </p:nvSpPr>
+        <p:spPr/>
+        <p:txBody>
+          <a:bodyPr/>
+          <a:lstStyle/>
+          <a:p>
+            <a:r>
+              <a:rPr lang="de-DE" dirty="0"/>
+              <a:t>Eine andere Überlegung</a:t>
+            </a:r>
+          </a:p>
+        </p:txBody>
+      </p:sp>
+    </p:spTree>
+    <p:extLst>
+      <p:ext uri="{BB962C8B-B14F-4D97-AF65-F5344CB8AC3E}">
+        <p14:creationId xmlns:p14="http://schemas.microsoft.com/office/powerpoint/2010/main" val="366699682"/>
+      </p:ext>
+    </p:extLst>
+  </p:cSld>
+  <p:clrMapOvr>
+    <a:masterClrMapping/>
+  </p:clrMapOvr>
+</p:sld>
+</file>
+
+<file path=ppt/slides/slide7.xml><?xml version="1.0" encoding="utf-8"?>
 <p:sld xmlns:a="http://schemas.openxmlformats.org/drawingml/2006/main" xmlns:r="http://schemas.openxmlformats.org/officeDocument/2006/relationships" xmlns:p="http://schemas.openxmlformats.org/presentationml/2006/main">
   <p:cSld>
     <p:spTree>
@@ -7236,7 +10436,7 @@
 </p:sld>
 </file>
 
-<file path=ppt/slides/slide4.xml><?xml version="1.0" encoding="utf-8"?>
+<file path=ppt/slides/slide8.xml><?xml version="1.0" encoding="utf-8"?>
 <p:sld xmlns:a="http://schemas.openxmlformats.org/drawingml/2006/main" xmlns:r="http://schemas.openxmlformats.org/officeDocument/2006/relationships" xmlns:p="http://schemas.openxmlformats.org/presentationml/2006/main">
   <p:cSld>
     <p:spTree>
@@ -7426,7 +10626,7 @@
 </p:sld>
 </file>
 
-<file path=ppt/slides/slide5.xml><?xml version="1.0" encoding="utf-8"?>
+<file path=ppt/slides/slide9.xml><?xml version="1.0" encoding="utf-8"?>
 <p:sld xmlns:a="http://schemas.openxmlformats.org/drawingml/2006/main" xmlns:r="http://schemas.openxmlformats.org/officeDocument/2006/relationships" xmlns:p="http://schemas.openxmlformats.org/presentationml/2006/main">
   <p:cSld>
     <p:spTree>

</xml_diff>